<commit_message>
Update responseCode mappings Fixes #36
</commit_message>
<xml_diff>
--- a/spec/additionalDescription/sources/NEP ErrorCodes.pptx
+++ b/spec/additionalDescription/sources/NEP ErrorCodes.pptx
@@ -8,7 +8,7 @@
     <p:sldId id="256" r:id="rId2"/>
     <p:sldId id="257" r:id="rId3"/>
     <p:sldId id="258" r:id="rId4"/>
-    <p:sldId id="259" r:id="rId5"/>
+    <p:sldId id="261" r:id="rId5"/>
     <p:sldId id="260" r:id="rId6"/>
   </p:sldIdLst>
   <p:sldSz cx="12192000" cy="6858000"/>
@@ -263,7 +263,7 @@
           <a:p>
             <a:fld id="{2122B19E-09EC-44A4-9188-1701461FF1B9}" type="datetimeFigureOut">
               <a:rPr lang="de-DE" smtClean="0"/>
-              <a:t>15.07.2024</a:t>
+              <a:t>24.07.2024</a:t>
             </a:fld>
             <a:endParaRPr lang="de-DE"/>
           </a:p>
@@ -461,7 +461,7 @@
           <a:p>
             <a:fld id="{2122B19E-09EC-44A4-9188-1701461FF1B9}" type="datetimeFigureOut">
               <a:rPr lang="de-DE" smtClean="0"/>
-              <a:t>15.07.2024</a:t>
+              <a:t>24.07.2024</a:t>
             </a:fld>
             <a:endParaRPr lang="de-DE"/>
           </a:p>
@@ -669,7 +669,7 @@
           <a:p>
             <a:fld id="{2122B19E-09EC-44A4-9188-1701461FF1B9}" type="datetimeFigureOut">
               <a:rPr lang="de-DE" smtClean="0"/>
-              <a:t>15.07.2024</a:t>
+              <a:t>24.07.2024</a:t>
             </a:fld>
             <a:endParaRPr lang="de-DE"/>
           </a:p>
@@ -867,7 +867,7 @@
           <a:p>
             <a:fld id="{2122B19E-09EC-44A4-9188-1701461FF1B9}" type="datetimeFigureOut">
               <a:rPr lang="de-DE" smtClean="0"/>
-              <a:t>15.07.2024</a:t>
+              <a:t>24.07.2024</a:t>
             </a:fld>
             <a:endParaRPr lang="de-DE"/>
           </a:p>
@@ -1142,7 +1142,7 @@
           <a:p>
             <a:fld id="{2122B19E-09EC-44A4-9188-1701461FF1B9}" type="datetimeFigureOut">
               <a:rPr lang="de-DE" smtClean="0"/>
-              <a:t>15.07.2024</a:t>
+              <a:t>24.07.2024</a:t>
             </a:fld>
             <a:endParaRPr lang="de-DE"/>
           </a:p>
@@ -1407,7 +1407,7 @@
           <a:p>
             <a:fld id="{2122B19E-09EC-44A4-9188-1701461FF1B9}" type="datetimeFigureOut">
               <a:rPr lang="de-DE" smtClean="0"/>
-              <a:t>15.07.2024</a:t>
+              <a:t>24.07.2024</a:t>
             </a:fld>
             <a:endParaRPr lang="de-DE"/>
           </a:p>
@@ -1819,7 +1819,7 @@
           <a:p>
             <a:fld id="{2122B19E-09EC-44A4-9188-1701461FF1B9}" type="datetimeFigureOut">
               <a:rPr lang="de-DE" smtClean="0"/>
-              <a:t>15.07.2024</a:t>
+              <a:t>24.07.2024</a:t>
             </a:fld>
             <a:endParaRPr lang="de-DE"/>
           </a:p>
@@ -1960,7 +1960,7 @@
           <a:p>
             <a:fld id="{2122B19E-09EC-44A4-9188-1701461FF1B9}" type="datetimeFigureOut">
               <a:rPr lang="de-DE" smtClean="0"/>
-              <a:t>15.07.2024</a:t>
+              <a:t>24.07.2024</a:t>
             </a:fld>
             <a:endParaRPr lang="de-DE"/>
           </a:p>
@@ -2073,7 +2073,7 @@
           <a:p>
             <a:fld id="{2122B19E-09EC-44A4-9188-1701461FF1B9}" type="datetimeFigureOut">
               <a:rPr lang="de-DE" smtClean="0"/>
-              <a:t>15.07.2024</a:t>
+              <a:t>24.07.2024</a:t>
             </a:fld>
             <a:endParaRPr lang="de-DE"/>
           </a:p>
@@ -2384,7 +2384,7 @@
           <a:p>
             <a:fld id="{2122B19E-09EC-44A4-9188-1701461FF1B9}" type="datetimeFigureOut">
               <a:rPr lang="de-DE" smtClean="0"/>
-              <a:t>15.07.2024</a:t>
+              <a:t>24.07.2024</a:t>
             </a:fld>
             <a:endParaRPr lang="de-DE"/>
           </a:p>
@@ -2672,7 +2672,7 @@
           <a:p>
             <a:fld id="{2122B19E-09EC-44A4-9188-1701461FF1B9}" type="datetimeFigureOut">
               <a:rPr lang="de-DE" smtClean="0"/>
-              <a:t>15.07.2024</a:t>
+              <a:t>24.07.2024</a:t>
             </a:fld>
             <a:endParaRPr lang="de-DE"/>
           </a:p>
@@ -2913,7 +2913,7 @@
           <a:p>
             <a:fld id="{2122B19E-09EC-44A4-9188-1701461FF1B9}" type="datetimeFigureOut">
               <a:rPr lang="de-DE" smtClean="0"/>
-              <a:t>15.07.2024</a:t>
+              <a:t>24.07.2024</a:t>
             </a:fld>
             <a:endParaRPr lang="de-DE"/>
           </a:p>
@@ -3387,14 +3387,14 @@
           <p:nvPr>
             <p:extLst>
               <p:ext uri="{D42A27DB-BD31-4B8C-83A1-F6EECF244321}">
-                <p14:modId xmlns:p14="http://schemas.microsoft.com/office/powerpoint/2010/main" val="1803841417"/>
+                <p14:modId xmlns:p14="http://schemas.microsoft.com/office/powerpoint/2010/main" val="4005527021"/>
               </p:ext>
             </p:extLst>
           </p:nvPr>
         </p:nvGraphicFramePr>
         <p:xfrm>
           <a:off x="570295" y="1650826"/>
-          <a:ext cx="10889740" cy="2082800"/>
+          <a:ext cx="10889740" cy="2377440"/>
         </p:xfrm>
         <a:graphic>
           <a:graphicData uri="http://schemas.openxmlformats.org/drawingml/2006/table">
@@ -3767,6 +3767,12 @@
                         <a:t>Some internal NEP error</a:t>
                       </a:r>
                     </a:p>
+                    <a:p>
+                      <a:r>
+                        <a:rPr lang="de-DE" sz="1400"/>
+                        <a:t>Client error</a:t>
+                      </a:r>
+                    </a:p>
                   </a:txBody>
                   <a:tcPr/>
                 </a:tc>
@@ -3850,6 +3856,12 @@
                       <a:r>
                         <a:rPr lang="de-DE" sz="1400"/>
                         <a:t>e.g. MWDI unavailable</a:t>
+                      </a:r>
+                    </a:p>
+                    <a:p>
+                      <a:r>
+                        <a:rPr lang="de-DE" sz="1400"/>
+                        <a:t>Server error</a:t>
                       </a:r>
                     </a:p>
                   </a:txBody>
@@ -3999,14 +4011,14 @@
           <p:nvPr>
             <p:extLst>
               <p:ext uri="{D42A27DB-BD31-4B8C-83A1-F6EECF244321}">
-                <p14:modId xmlns:p14="http://schemas.microsoft.com/office/powerpoint/2010/main" val="1711679171"/>
+                <p14:modId xmlns:p14="http://schemas.microsoft.com/office/powerpoint/2010/main" val="309118415"/>
               </p:ext>
             </p:extLst>
           </p:nvPr>
         </p:nvGraphicFramePr>
         <p:xfrm>
           <a:off x="570295" y="1650826"/>
-          <a:ext cx="10889740" cy="1935480"/>
+          <a:ext cx="10889740" cy="2230120"/>
         </p:xfrm>
         <a:graphic>
           <a:graphicData uri="http://schemas.openxmlformats.org/drawingml/2006/table">
@@ -4360,6 +4372,12 @@
                         <a:t>Some internal NEP error</a:t>
                       </a:r>
                     </a:p>
+                    <a:p>
+                      <a:r>
+                        <a:rPr lang="de-DE" sz="1400"/>
+                        <a:t>Client error</a:t>
+                      </a:r>
+                    </a:p>
                   </a:txBody>
                   <a:tcPr/>
                 </a:tc>
@@ -4443,6 +4461,12 @@
                       <a:r>
                         <a:rPr lang="de-DE" sz="1400"/>
                         <a:t>e.g. MATR unavailable</a:t>
+                      </a:r>
+                    </a:p>
+                    <a:p>
+                      <a:r>
+                        <a:rPr lang="de-DE" sz="1400"/>
+                        <a:t>Server error</a:t>
                       </a:r>
                     </a:p>
                   </a:txBody>
@@ -4592,14 +4616,14 @@
           <p:nvPr>
             <p:extLst>
               <p:ext uri="{D42A27DB-BD31-4B8C-83A1-F6EECF244321}">
-                <p14:modId xmlns:p14="http://schemas.microsoft.com/office/powerpoint/2010/main" val="2533744590"/>
+                <p14:modId xmlns:p14="http://schemas.microsoft.com/office/powerpoint/2010/main" val="243660731"/>
               </p:ext>
             </p:extLst>
           </p:nvPr>
         </p:nvGraphicFramePr>
         <p:xfrm>
           <a:off x="570295" y="1650826"/>
-          <a:ext cx="10889740" cy="3733800"/>
+          <a:ext cx="10889741" cy="3469640"/>
         </p:xfrm>
         <a:graphic>
           <a:graphicData uri="http://schemas.openxmlformats.org/drawingml/2006/table">
@@ -4608,41 +4632,48 @@
                 <a:tableStyleId>{5C22544A-7EE6-4342-B048-85BDC9FD1C3A}</a:tableStyleId>
               </a:tblPr>
               <a:tblGrid>
-                <a:gridCol w="2177948">
+                <a:gridCol w="2395542">
                   <a:extLst>
                     <a:ext uri="{9D8B030D-6E8A-4147-A177-3AD203B41FA5}">
                       <a16:colId xmlns:a16="http://schemas.microsoft.com/office/drawing/2014/main" val="3666746875"/>
                     </a:ext>
                   </a:extLst>
                 </a:gridCol>
-                <a:gridCol w="2177948">
+                <a:gridCol w="1478942">
                   <a:extLst>
                     <a:ext uri="{9D8B030D-6E8A-4147-A177-3AD203B41FA5}">
                       <a16:colId xmlns:a16="http://schemas.microsoft.com/office/drawing/2014/main" val="4257571136"/>
                     </a:ext>
                   </a:extLst>
                 </a:gridCol>
-                <a:gridCol w="2177948">
+                <a:gridCol w="1057524">
                   <a:extLst>
                     <a:ext uri="{9D8B030D-6E8A-4147-A177-3AD203B41FA5}">
                       <a16:colId xmlns:a16="http://schemas.microsoft.com/office/drawing/2014/main" val="1965016822"/>
                     </a:ext>
                   </a:extLst>
                 </a:gridCol>
-                <a:gridCol w="2177948">
+                <a:gridCol w="2162754">
                   <a:extLst>
                     <a:ext uri="{9D8B030D-6E8A-4147-A177-3AD203B41FA5}">
                       <a16:colId xmlns:a16="http://schemas.microsoft.com/office/drawing/2014/main" val="2808797744"/>
                     </a:ext>
                   </a:extLst>
                 </a:gridCol>
-                <a:gridCol w="2177948">
+                <a:gridCol w="2480807">
                   <a:extLst>
                     <a:ext uri="{9D8B030D-6E8A-4147-A177-3AD203B41FA5}">
                       <a16:colId xmlns:a16="http://schemas.microsoft.com/office/drawing/2014/main" val="3854052125"/>
                     </a:ext>
                   </a:extLst>
                 </a:gridCol>
+                <a:gridCol w="1314172">
+                  <a:extLst>
+                    <a:ext uri="{9D8B030D-6E8A-4147-A177-3AD203B41FA5}">
+                      <a16:colId xmlns:a16="http://schemas.microsoft.com/office/drawing/2014/main" val="3775549604"/>
+                    </a:ext>
+                  </a:extLst>
+                </a:gridCol>
               </a:tblGrid>
               <a:tr h="0">
                 <a:tc>
@@ -4705,6 +4736,19 @@
                       <a:r>
                         <a:rPr lang="de-DE" sz="1100"/>
                         <a:t>Info</a:t>
+                      </a:r>
+                    </a:p>
+                  </a:txBody>
+                  <a:tcPr/>
+                </a:tc>
+                <a:tc>
+                  <a:txBody>
+                    <a:bodyPr/>
+                    <a:lstStyle/>
+                    <a:p>
+                      <a:r>
+                        <a:rPr lang="de-DE" sz="1100"/>
+                        <a:t>Client / Server error</a:t>
                       </a:r>
                     </a:p>
                   </a:txBody>
@@ -4786,8 +4830,18 @@
                     <a:p>
                       <a:r>
                         <a:rPr lang="de-DE" sz="1100"/>
-                        <a:t>mountName known by MATR</a:t>
-                      </a:r>
+                        <a:t>mountName known by MATR, mountName given as string</a:t>
+                      </a:r>
+                    </a:p>
+                  </a:txBody>
+                  <a:tcPr/>
+                </a:tc>
+                <a:tc>
+                  <a:txBody>
+                    <a:bodyPr/>
+                    <a:lstStyle/>
+                    <a:p>
+                      <a:endParaRPr lang="de-DE" sz="1100"/>
                     </a:p>
                   </a:txBody>
                   <a:tcPr/>
@@ -4902,171 +4956,6 @@
                   </a:txBody>
                   <a:tcPr/>
                 </a:tc>
-                <a:extLst>
-                  <a:ext uri="{0D108BD9-81ED-4DB2-BD59-A6C34878D82A}">
-                    <a16:rowId xmlns:a16="http://schemas.microsoft.com/office/drawing/2014/main" val="3635168493"/>
-                  </a:ext>
-                </a:extLst>
-              </a:tr>
-              <a:tr h="370840">
-                <a:tc>
-                  <a:txBody>
-                    <a:bodyPr/>
-                    <a:lstStyle/>
-                    <a:p>
-                      <a:r>
-                        <a:rPr lang="de-DE" sz="1100"/>
-                        <a:t>requestBody missing, </a:t>
-                      </a:r>
-                      <a:r>
-                        <a:rPr lang="de-DE" sz="1100">
-                          <a:solidFill>
-                            <a:srgbClr val="C00000"/>
-                          </a:solidFill>
-                        </a:rPr>
-                        <a:t>fail</a:t>
-                      </a:r>
-                      <a:endParaRPr lang="de-DE" sz="1100"/>
-                    </a:p>
-                  </a:txBody>
-                  <a:tcPr/>
-                </a:tc>
-                <a:tc>
-                  <a:txBody>
-                    <a:bodyPr/>
-                    <a:lstStyle/>
-                    <a:p>
-                      <a:r>
-                        <a:rPr lang="de-DE" sz="1100"/>
-                        <a:t>Required requestBody is missing</a:t>
-                      </a:r>
-                    </a:p>
-                  </a:txBody>
-                  <a:tcPr/>
-                </a:tc>
-                <a:tc>
-                  <a:txBody>
-                    <a:bodyPr/>
-                    <a:lstStyle/>
-                    <a:p>
-                      <a:r>
-                        <a:rPr lang="de-DE" sz="1100">
-                          <a:solidFill>
-                            <a:srgbClr val="C00000"/>
-                          </a:solidFill>
-                        </a:rPr>
-                        <a:t>400</a:t>
-                      </a:r>
-                    </a:p>
-                  </a:txBody>
-                  <a:tcPr/>
-                </a:tc>
-                <a:tc>
-                  <a:txBody>
-                    <a:bodyPr/>
-                    <a:lstStyle/>
-                    <a:p>
-                      <a:r>
-                        <a:rPr lang="de-DE" sz="1100"/>
-                        <a:t>Bad request</a:t>
-                      </a:r>
-                    </a:p>
-                  </a:txBody>
-                  <a:tcPr/>
-                </a:tc>
-                <a:tc>
-                  <a:txBody>
-                    <a:bodyPr/>
-                    <a:lstStyle/>
-                    <a:p>
-                      <a:r>
-                        <a:rPr lang="de-DE" sz="1100"/>
-                        <a:t>MATR returns a 415, unsupported media type, in NEP this should be 400 to indicate a client error</a:t>
-                      </a:r>
-                    </a:p>
-                  </a:txBody>
-                  <a:tcPr/>
-                </a:tc>
-                <a:extLst>
-                  <a:ext uri="{0D108BD9-81ED-4DB2-BD59-A6C34878D82A}">
-                    <a16:rowId xmlns:a16="http://schemas.microsoft.com/office/drawing/2014/main" val="1492686443"/>
-                  </a:ext>
-                </a:extLst>
-              </a:tr>
-              <a:tr h="370840">
-                <a:tc>
-                  <a:txBody>
-                    <a:bodyPr/>
-                    <a:lstStyle/>
-                    <a:p>
-                      <a:r>
-                        <a:rPr lang="de-DE" sz="1100">
-                          <a:solidFill>
-                            <a:schemeClr val="tx1"/>
-                          </a:solidFill>
-                        </a:rPr>
-                        <a:t>requestBody with missing mountName attribute, </a:t>
-                      </a:r>
-                      <a:r>
-                        <a:rPr lang="de-DE" sz="1100">
-                          <a:solidFill>
-                            <a:srgbClr val="C00000"/>
-                          </a:solidFill>
-                        </a:rPr>
-                        <a:t>fail</a:t>
-                      </a:r>
-                      <a:endParaRPr lang="de-DE" sz="1100">
-                        <a:solidFill>
-                          <a:schemeClr val="tx1"/>
-                        </a:solidFill>
-                      </a:endParaRPr>
-                    </a:p>
-                  </a:txBody>
-                  <a:tcPr/>
-                </a:tc>
-                <a:tc>
-                  <a:txBody>
-                    <a:bodyPr/>
-                    <a:lstStyle/>
-                    <a:p>
-                      <a:r>
-                        <a:rPr lang="de-DE" sz="1100"/>
-                        <a:t>Missing required parameter</a:t>
-                      </a:r>
-                    </a:p>
-                  </a:txBody>
-                  <a:tcPr/>
-                </a:tc>
-                <a:tc>
-                  <a:txBody>
-                    <a:bodyPr/>
-                    <a:lstStyle/>
-                    <a:p>
-                      <a:r>
-                        <a:rPr lang="de-DE" sz="1100">
-                          <a:solidFill>
-                            <a:srgbClr val="C00000"/>
-                          </a:solidFill>
-                        </a:rPr>
-                        <a:t>400</a:t>
-                      </a:r>
-                    </a:p>
-                  </a:txBody>
-                  <a:tcPr/>
-                </a:tc>
-                <a:tc>
-                  <a:txBody>
-                    <a:bodyPr/>
-                    <a:lstStyle/>
-                    <a:p>
-                      <a:r>
-                        <a:rPr lang="de-DE" sz="1100"/>
-                        <a:t>Bad request</a:t>
-                      </a:r>
-                    </a:p>
-                  </a:txBody>
-                  <a:tcPr/>
-                </a:tc>
                 <a:tc>
                   <a:txBody>
                     <a:bodyPr/>
@@ -5089,28 +4978,218 @@
                         <a:tabLst/>
                         <a:defRPr/>
                       </a:pPr>
-                      <a:r>
-                        <a:rPr lang="de-DE" sz="1100" kern="1200">
-                          <a:solidFill>
-                            <a:schemeClr val="dk1"/>
-                          </a:solidFill>
-                          <a:latin typeface="+mn-lt"/>
-                          <a:ea typeface="+mn-ea"/>
-                          <a:cs typeface="+mn-cs"/>
-                        </a:rPr>
-                        <a:t>MATR returns 400, </a:t>
-                      </a:r>
-                      <a:r>
-                        <a:rPr lang="en-US" sz="1050" i="1" kern="1200">
-                          <a:solidFill>
-                            <a:schemeClr val="dk1"/>
-                          </a:solidFill>
-                          <a:latin typeface="+mn-lt"/>
-                          <a:ea typeface="+mn-ea"/>
-                          <a:cs typeface="+mn-cs"/>
-                        </a:rPr>
-                        <a:t>"request.body should have required property 'mount-name'"</a:t>
-                      </a:r>
+                      <a:endParaRPr lang="en-US" sz="1100" kern="1200">
+                        <a:solidFill>
+                          <a:schemeClr val="dk1"/>
+                        </a:solidFill>
+                        <a:latin typeface="+mn-lt"/>
+                        <a:ea typeface="+mn-ea"/>
+                        <a:cs typeface="+mn-cs"/>
+                      </a:endParaRPr>
+                    </a:p>
+                  </a:txBody>
+                  <a:tcPr/>
+                </a:tc>
+                <a:extLst>
+                  <a:ext uri="{0D108BD9-81ED-4DB2-BD59-A6C34878D82A}">
+                    <a16:rowId xmlns:a16="http://schemas.microsoft.com/office/drawing/2014/main" val="3635168493"/>
+                  </a:ext>
+                </a:extLst>
+              </a:tr>
+              <a:tr h="370840">
+                <a:tc>
+                  <a:txBody>
+                    <a:bodyPr/>
+                    <a:lstStyle/>
+                    <a:p>
+                      <a:r>
+                        <a:rPr lang="de-DE" sz="1100"/>
+                        <a:t>requestBody missing, </a:t>
+                      </a:r>
+                      <a:r>
+                        <a:rPr lang="de-DE" sz="1100">
+                          <a:solidFill>
+                            <a:srgbClr val="C00000"/>
+                          </a:solidFill>
+                        </a:rPr>
+                        <a:t>fail</a:t>
+                      </a:r>
+                      <a:endParaRPr lang="de-DE" sz="1100"/>
+                    </a:p>
+                  </a:txBody>
+                  <a:tcPr/>
+                </a:tc>
+                <a:tc>
+                  <a:txBody>
+                    <a:bodyPr/>
+                    <a:lstStyle/>
+                    <a:p>
+                      <a:r>
+                        <a:rPr lang="de-DE" sz="1100"/>
+                        <a:t>Required requestBody is missing</a:t>
+                      </a:r>
+                    </a:p>
+                  </a:txBody>
+                  <a:tcPr/>
+                </a:tc>
+                <a:tc>
+                  <a:txBody>
+                    <a:bodyPr/>
+                    <a:lstStyle/>
+                    <a:p>
+                      <a:r>
+                        <a:rPr lang="de-DE" sz="1100">
+                          <a:solidFill>
+                            <a:srgbClr val="C00000"/>
+                          </a:solidFill>
+                        </a:rPr>
+                        <a:t>400</a:t>
+                      </a:r>
+                    </a:p>
+                  </a:txBody>
+                  <a:tcPr/>
+                </a:tc>
+                <a:tc>
+                  <a:txBody>
+                    <a:bodyPr/>
+                    <a:lstStyle/>
+                    <a:p>
+                      <a:r>
+                        <a:rPr lang="de-DE" sz="1100"/>
+                        <a:t>Bad request</a:t>
+                      </a:r>
+                    </a:p>
+                  </a:txBody>
+                  <a:tcPr/>
+                </a:tc>
+                <a:tc>
+                  <a:txBody>
+                    <a:bodyPr/>
+                    <a:lstStyle/>
+                    <a:p>
+                      <a:r>
+                        <a:rPr lang="de-DE" sz="1100"/>
+                        <a:t>MATR returns a 415, unsupported media type, in NEP this should be 400</a:t>
+                      </a:r>
+                    </a:p>
+                  </a:txBody>
+                  <a:tcPr/>
+                </a:tc>
+                <a:tc>
+                  <a:txBody>
+                    <a:bodyPr/>
+                    <a:lstStyle/>
+                    <a:p>
+                      <a:r>
+                        <a:rPr lang="de-DE" sz="1100"/>
+                        <a:t>Client (NEP)</a:t>
+                      </a:r>
+                    </a:p>
+                  </a:txBody>
+                  <a:tcPr/>
+                </a:tc>
+                <a:extLst>
+                  <a:ext uri="{0D108BD9-81ED-4DB2-BD59-A6C34878D82A}">
+                    <a16:rowId xmlns:a16="http://schemas.microsoft.com/office/drawing/2014/main" val="1492686443"/>
+                  </a:ext>
+                </a:extLst>
+              </a:tr>
+              <a:tr h="370840">
+                <a:tc>
+                  <a:txBody>
+                    <a:bodyPr/>
+                    <a:lstStyle/>
+                    <a:p>
+                      <a:r>
+                        <a:rPr lang="de-DE" sz="1100">
+                          <a:solidFill>
+                            <a:schemeClr val="tx1"/>
+                          </a:solidFill>
+                        </a:rPr>
+                        <a:t>requestBody with missing mountName attribute, </a:t>
+                      </a:r>
+                      <a:r>
+                        <a:rPr lang="de-DE" sz="1100">
+                          <a:solidFill>
+                            <a:srgbClr val="C00000"/>
+                          </a:solidFill>
+                        </a:rPr>
+                        <a:t>fail</a:t>
+                      </a:r>
+                      <a:endParaRPr lang="de-DE" sz="1100">
+                        <a:solidFill>
+                          <a:schemeClr val="tx1"/>
+                        </a:solidFill>
+                      </a:endParaRPr>
+                    </a:p>
+                  </a:txBody>
+                  <a:tcPr/>
+                </a:tc>
+                <a:tc>
+                  <a:txBody>
+                    <a:bodyPr/>
+                    <a:lstStyle/>
+                    <a:p>
+                      <a:r>
+                        <a:rPr lang="de-DE" sz="1100"/>
+                        <a:t>Missing required parameter</a:t>
+                      </a:r>
+                    </a:p>
+                  </a:txBody>
+                  <a:tcPr/>
+                </a:tc>
+                <a:tc>
+                  <a:txBody>
+                    <a:bodyPr/>
+                    <a:lstStyle/>
+                    <a:p>
+                      <a:r>
+                        <a:rPr lang="de-DE" sz="1100">
+                          <a:solidFill>
+                            <a:srgbClr val="C00000"/>
+                          </a:solidFill>
+                        </a:rPr>
+                        <a:t>400</a:t>
+                      </a:r>
+                    </a:p>
+                  </a:txBody>
+                  <a:tcPr/>
+                </a:tc>
+                <a:tc>
+                  <a:txBody>
+                    <a:bodyPr/>
+                    <a:lstStyle/>
+                    <a:p>
+                      <a:r>
+                        <a:rPr lang="de-DE" sz="1100"/>
+                        <a:t>Bad request</a:t>
+                      </a:r>
+                    </a:p>
+                  </a:txBody>
+                  <a:tcPr/>
+                </a:tc>
+                <a:tc>
+                  <a:txBody>
+                    <a:bodyPr/>
+                    <a:lstStyle/>
+                    <a:p>
+                      <a:pPr marL="0" marR="0" lvl="0" indent="0" algn="l" defTabSz="914400" rtl="0" eaLnBrk="1" fontAlgn="auto" latinLnBrk="0" hangingPunct="1">
+                        <a:lnSpc>
+                          <a:spcPct val="100000"/>
+                        </a:lnSpc>
+                        <a:spcBef>
+                          <a:spcPts val="0"/>
+                        </a:spcBef>
+                        <a:spcAft>
+                          <a:spcPts val="0"/>
+                        </a:spcAft>
+                        <a:buClrTx/>
+                        <a:buSzTx/>
+                        <a:buFontTx/>
+                        <a:buNone/>
+                        <a:tabLst/>
+                        <a:defRPr/>
+                      </a:pPr>
                       <a:endParaRPr lang="en-US" sz="1100" i="1" kern="1200">
                         <a:solidFill>
                           <a:schemeClr val="dk1"/>
@@ -5123,6 +5202,43 @@
                   </a:txBody>
                   <a:tcPr/>
                 </a:tc>
+                <a:tc>
+                  <a:txBody>
+                    <a:bodyPr/>
+                    <a:lstStyle/>
+                    <a:p>
+                      <a:pPr marL="0" marR="0" lvl="0" indent="0" algn="l" defTabSz="914400" rtl="0" eaLnBrk="1" fontAlgn="auto" latinLnBrk="0" hangingPunct="1">
+                        <a:lnSpc>
+                          <a:spcPct val="100000"/>
+                        </a:lnSpc>
+                        <a:spcBef>
+                          <a:spcPts val="0"/>
+                        </a:spcBef>
+                        <a:spcAft>
+                          <a:spcPts val="0"/>
+                        </a:spcAft>
+                        <a:buClrTx/>
+                        <a:buSzTx/>
+                        <a:buFontTx/>
+                        <a:buNone/>
+                        <a:tabLst/>
+                        <a:defRPr/>
+                      </a:pPr>
+                      <a:r>
+                        <a:rPr lang="en-US" sz="1100" i="0" kern="1200">
+                          <a:solidFill>
+                            <a:schemeClr val="dk1"/>
+                          </a:solidFill>
+                          <a:latin typeface="+mn-lt"/>
+                          <a:ea typeface="+mn-ea"/>
+                          <a:cs typeface="+mn-cs"/>
+                        </a:rPr>
+                        <a:t>Client (NEP)</a:t>
+                      </a:r>
+                    </a:p>
+                  </a:txBody>
+                  <a:tcPr/>
+                </a:tc>
                 <a:extLst>
                   <a:ext uri="{0D108BD9-81ED-4DB2-BD59-A6C34878D82A}">
                     <a16:rowId xmlns:a16="http://schemas.microsoft.com/office/drawing/2014/main" val="4092892697"/>
@@ -5194,10 +5310,7 @@
                       <a:br>
                         <a:rPr lang="de-DE" sz="1100"/>
                       </a:br>
-                      <a:r>
-                        <a:rPr lang="de-DE" sz="1100"/>
-                        <a:t>(message might be modified)</a:t>
-                      </a:r>
+                      <a:endParaRPr lang="de-DE" sz="1100"/>
                     </a:p>
                   </a:txBody>
                   <a:tcPr/>
@@ -5210,6 +5323,19 @@
                       <a:r>
                         <a:rPr lang="de-DE" sz="1100"/>
                         <a:t>MATR currently returns a 500, there‘s an open issue to change it to 404</a:t>
+                      </a:r>
+                    </a:p>
+                  </a:txBody>
+                  <a:tcPr/>
+                </a:tc>
+                <a:tc>
+                  <a:txBody>
+                    <a:bodyPr/>
+                    <a:lstStyle/>
+                    <a:p>
+                      <a:r>
+                        <a:rPr lang="de-DE" sz="1100"/>
+                        <a:t>Server (MATR)</a:t>
                       </a:r>
                     </a:p>
                   </a:txBody>
@@ -5300,6 +5426,19 @@
                   </a:txBody>
                   <a:tcPr/>
                 </a:tc>
+                <a:tc>
+                  <a:txBody>
+                    <a:bodyPr/>
+                    <a:lstStyle/>
+                    <a:p>
+                      <a:r>
+                        <a:rPr lang="de-DE" sz="1100"/>
+                        <a:t>Client (NEP)</a:t>
+                      </a:r>
+                    </a:p>
+                  </a:txBody>
+                  <a:tcPr/>
+                </a:tc>
                 <a:extLst>
                   <a:ext uri="{0D108BD9-81ED-4DB2-BD59-A6C34878D82A}">
                     <a16:rowId xmlns:a16="http://schemas.microsoft.com/office/drawing/2014/main" val="4107805488"/>
@@ -5380,6 +5519,19 @@
                       <a:r>
                         <a:rPr lang="de-DE" sz="1100"/>
                         <a:t>e.g. MATR unavailable</a:t>
+                      </a:r>
+                    </a:p>
+                  </a:txBody>
+                  <a:tcPr/>
+                </a:tc>
+                <a:tc>
+                  <a:txBody>
+                    <a:bodyPr/>
+                    <a:lstStyle/>
+                    <a:p>
+                      <a:r>
+                        <a:rPr lang="de-DE" sz="1100"/>
+                        <a:t>Server (MATR)</a:t>
                       </a:r>
                     </a:p>
                   </a:txBody>
@@ -5571,14 +5723,14 @@
           <p:nvPr>
             <p:extLst>
               <p:ext uri="{D42A27DB-BD31-4B8C-83A1-F6EECF244321}">
-                <p14:modId xmlns:p14="http://schemas.microsoft.com/office/powerpoint/2010/main" val="2905972266"/>
+                <p14:modId xmlns:p14="http://schemas.microsoft.com/office/powerpoint/2010/main" val="1424448471"/>
               </p:ext>
             </p:extLst>
           </p:nvPr>
         </p:nvGraphicFramePr>
         <p:xfrm>
           <a:off x="583644" y="1944502"/>
-          <a:ext cx="10889740" cy="4429760"/>
+          <a:ext cx="10889739" cy="4307840"/>
         </p:xfrm>
         <a:graphic>
           <a:graphicData uri="http://schemas.openxmlformats.org/drawingml/2006/table">
@@ -5587,41 +5739,48 @@
                 <a:tableStyleId>{5C22544A-7EE6-4342-B048-85BDC9FD1C3A}</a:tableStyleId>
               </a:tblPr>
               <a:tblGrid>
-                <a:gridCol w="2177948">
+                <a:gridCol w="1656651">
                   <a:extLst>
                     <a:ext uri="{9D8B030D-6E8A-4147-A177-3AD203B41FA5}">
                       <a16:colId xmlns:a16="http://schemas.microsoft.com/office/drawing/2014/main" val="3666746875"/>
                     </a:ext>
                   </a:extLst>
                 </a:gridCol>
-                <a:gridCol w="2177948">
+                <a:gridCol w="2124971">
                   <a:extLst>
                     <a:ext uri="{9D8B030D-6E8A-4147-A177-3AD203B41FA5}">
                       <a16:colId xmlns:a16="http://schemas.microsoft.com/office/drawing/2014/main" val="4257571136"/>
                     </a:ext>
                   </a:extLst>
                 </a:gridCol>
-                <a:gridCol w="2177948">
+                <a:gridCol w="1335819">
                   <a:extLst>
                     <a:ext uri="{9D8B030D-6E8A-4147-A177-3AD203B41FA5}">
                       <a16:colId xmlns:a16="http://schemas.microsoft.com/office/drawing/2014/main" val="1965016822"/>
                     </a:ext>
                   </a:extLst>
                 </a:gridCol>
-                <a:gridCol w="2177948">
+                <a:gridCol w="1820849">
                   <a:extLst>
                     <a:ext uri="{9D8B030D-6E8A-4147-A177-3AD203B41FA5}">
                       <a16:colId xmlns:a16="http://schemas.microsoft.com/office/drawing/2014/main" val="2808797744"/>
                     </a:ext>
                   </a:extLst>
                 </a:gridCol>
-                <a:gridCol w="2177948">
+                <a:gridCol w="2552369">
                   <a:extLst>
                     <a:ext uri="{9D8B030D-6E8A-4147-A177-3AD203B41FA5}">
                       <a16:colId xmlns:a16="http://schemas.microsoft.com/office/drawing/2014/main" val="3854052125"/>
                     </a:ext>
                   </a:extLst>
                 </a:gridCol>
+                <a:gridCol w="1399080">
+                  <a:extLst>
+                    <a:ext uri="{9D8B030D-6E8A-4147-A177-3AD203B41FA5}">
+                      <a16:colId xmlns:a16="http://schemas.microsoft.com/office/drawing/2014/main" val="3190374473"/>
+                    </a:ext>
+                  </a:extLst>
+                </a:gridCol>
               </a:tblGrid>
               <a:tr h="0">
                 <a:tc>
@@ -5684,6 +5843,19 @@
                       <a:r>
                         <a:rPr lang="de-DE" sz="1400"/>
                         <a:t>Info</a:t>
+                      </a:r>
+                    </a:p>
+                  </a:txBody>
+                  <a:tcPr/>
+                </a:tc>
+                <a:tc>
+                  <a:txBody>
+                    <a:bodyPr/>
+                    <a:lstStyle/>
+                    <a:p>
+                      <a:r>
+                        <a:rPr lang="de-DE" sz="1400"/>
+                        <a:t>Client / Server error</a:t>
                       </a:r>
                     </a:p>
                   </a:txBody>
@@ -5702,7 +5874,7 @@
                     <a:lstStyle/>
                     <a:p>
                       <a:r>
-                        <a:rPr lang="de-DE" sz="1200">
+                        <a:rPr lang="de-DE" sz="1000">
                           <a:solidFill>
                             <a:schemeClr val="tx1"/>
                           </a:solidFill>
@@ -5718,7 +5890,7 @@
                     <a:bodyPr/>
                     <a:lstStyle/>
                     <a:p>
-                      <a:endParaRPr lang="de-DE" sz="1200">
+                      <a:endParaRPr lang="de-DE" sz="1000">
                         <a:solidFill>
                           <a:schemeClr val="tx1"/>
                         </a:solidFill>
@@ -5733,7 +5905,7 @@
                     <a:lstStyle/>
                     <a:p>
                       <a:r>
-                        <a:rPr lang="de-DE" sz="1200">
+                        <a:rPr lang="de-DE" sz="1000">
                           <a:solidFill>
                             <a:schemeClr val="accent6">
                               <a:lumMod val="50000"/>
@@ -5752,7 +5924,7 @@
                     <a:lstStyle/>
                     <a:p>
                       <a:r>
-                        <a:rPr lang="de-DE" sz="1200">
+                        <a:rPr lang="de-DE" sz="1000">
                           <a:solidFill>
                             <a:schemeClr val="tx1"/>
                           </a:solidFill>
@@ -5769,13 +5941,27 @@
                     <a:lstStyle/>
                     <a:p>
                       <a:r>
-                        <a:rPr lang="de-DE" sz="1200">
+                        <a:rPr lang="de-DE" sz="1000">
                           <a:solidFill>
                             <a:schemeClr val="tx1"/>
                           </a:solidFill>
                         </a:rPr>
                         <a:t>MATR returns only requestId (processing can take a while)</a:t>
                       </a:r>
+                    </a:p>
+                  </a:txBody>
+                  <a:tcPr/>
+                </a:tc>
+                <a:tc>
+                  <a:txBody>
+                    <a:bodyPr/>
+                    <a:lstStyle/>
+                    <a:p>
+                      <a:endParaRPr lang="de-DE" sz="1000">
+                        <a:solidFill>
+                          <a:schemeClr val="tx1"/>
+                        </a:solidFill>
+                      </a:endParaRPr>
                     </a:p>
                   </a:txBody>
                   <a:tcPr/>
@@ -5793,7 +5979,7 @@
                     <a:lstStyle/>
                     <a:p>
                       <a:r>
-                        <a:rPr lang="de-DE" sz="1200">
+                        <a:rPr lang="de-DE" sz="1000">
                           <a:solidFill>
                             <a:schemeClr val="tx1"/>
                           </a:solidFill>
@@ -5809,7 +5995,7 @@
                     <a:bodyPr/>
                     <a:lstStyle/>
                     <a:p>
-                      <a:endParaRPr lang="de-DE" sz="1200">
+                      <a:endParaRPr lang="de-DE" sz="1000">
                         <a:solidFill>
                           <a:schemeClr val="tx1"/>
                         </a:solidFill>
@@ -5824,7 +6010,7 @@
                     <a:lstStyle/>
                     <a:p>
                       <a:r>
-                        <a:rPr lang="de-DE" sz="1200">
+                        <a:rPr lang="de-DE" sz="1000">
                           <a:solidFill>
                             <a:schemeClr val="accent6">
                               <a:lumMod val="50000"/>
@@ -5843,7 +6029,7 @@
                     <a:lstStyle/>
                     <a:p>
                       <a:r>
-                        <a:rPr lang="de-DE" sz="1200">
+                        <a:rPr lang="de-DE" sz="1000">
                           <a:solidFill>
                             <a:schemeClr val="tx1"/>
                           </a:solidFill>
@@ -5860,13 +6046,27 @@
                     <a:lstStyle/>
                     <a:p>
                       <a:r>
-                        <a:rPr lang="de-DE" sz="1200">
+                        <a:rPr lang="de-DE" sz="1000">
                           <a:solidFill>
                             <a:schemeClr val="tx1"/>
                           </a:solidFill>
                         </a:rPr>
                         <a:t>MATR ignores additional unneeded attributes, NEP can do the same</a:t>
                       </a:r>
+                    </a:p>
+                  </a:txBody>
+                  <a:tcPr/>
+                </a:tc>
+                <a:tc>
+                  <a:txBody>
+                    <a:bodyPr/>
+                    <a:lstStyle/>
+                    <a:p>
+                      <a:endParaRPr lang="de-DE" sz="1000">
+                        <a:solidFill>
+                          <a:schemeClr val="tx1"/>
+                        </a:solidFill>
+                      </a:endParaRPr>
                     </a:p>
                   </a:txBody>
                   <a:tcPr/>
@@ -5884,41 +6084,41 @@
                     <a:lstStyle/>
                     <a:p>
                       <a:r>
-                        <a:rPr lang="de-DE" sz="1200">
+                        <a:rPr lang="de-DE" sz="1000">
                           <a:solidFill>
                             <a:schemeClr val="tx1"/>
                           </a:solidFill>
                         </a:rPr>
-                        <a:t>Incomplete requestBody</a:t>
-                      </a:r>
-                    </a:p>
-                  </a:txBody>
-                  <a:tcPr/>
-                </a:tc>
-                <a:tc>
-                  <a:txBody>
-                    <a:bodyPr/>
-                    <a:lstStyle/>
-                    <a:p>
-                      <a:r>
-                        <a:rPr lang="de-DE" sz="1200">
+                        <a:t>requestBody missing</a:t>
+                      </a:r>
+                    </a:p>
+                  </a:txBody>
+                  <a:tcPr/>
+                </a:tc>
+                <a:tc>
+                  <a:txBody>
+                    <a:bodyPr/>
+                    <a:lstStyle/>
+                    <a:p>
+                      <a:r>
+                        <a:rPr lang="de-DE" sz="1000">
                           <a:solidFill>
                             <a:schemeClr val="tx1"/>
                           </a:solidFill>
                         </a:rPr>
-                        <a:t>Incomplete requestBody: complete info needed, as otherwise NEP cannot send answer to Netexplorer</a:t>
-                      </a:r>
-                    </a:p>
-                  </a:txBody>
-                  <a:tcPr/>
-                </a:tc>
-                <a:tc>
-                  <a:txBody>
-                    <a:bodyPr/>
-                    <a:lstStyle/>
-                    <a:p>
-                      <a:r>
-                        <a:rPr lang="de-DE" sz="1200">
+                        <a:t>requestBody required, but missing</a:t>
+                      </a:r>
+                    </a:p>
+                  </a:txBody>
+                  <a:tcPr/>
+                </a:tc>
+                <a:tc>
+                  <a:txBody>
+                    <a:bodyPr/>
+                    <a:lstStyle/>
+                    <a:p>
+                      <a:r>
+                        <a:rPr lang="de-DE" sz="1000">
                           <a:solidFill>
                             <a:srgbClr val="C00000"/>
                           </a:solidFill>
@@ -5935,7 +6135,7 @@
                     <a:lstStyle/>
                     <a:p>
                       <a:r>
-                        <a:rPr lang="de-DE" sz="1200">
+                        <a:rPr lang="de-DE" sz="1000">
                           <a:solidFill>
                             <a:schemeClr val="tx1"/>
                           </a:solidFill>
@@ -5945,131 +6145,46 @@
                     </a:p>
                     <a:p>
                       <a:r>
-                        <a:rPr lang="de-DE" sz="1200">
+                        <a:rPr lang="de-DE" sz="1000">
                           <a:solidFill>
                             <a:schemeClr val="tx1"/>
                           </a:solidFill>
                         </a:rPr>
-                        <a:t>„incomplete requestBody“</a:t>
-                      </a:r>
-                    </a:p>
-                  </a:txBody>
-                  <a:tcPr/>
-                </a:tc>
-                <a:tc>
-                  <a:txBody>
-                    <a:bodyPr/>
-                    <a:lstStyle/>
-                    <a:p>
-                      <a:r>
-                        <a:rPr lang="de-DE" sz="1200">
+                        <a:t>„missing requestBody“</a:t>
+                      </a:r>
+                    </a:p>
+                  </a:txBody>
+                  <a:tcPr/>
+                </a:tc>
+                <a:tc>
+                  <a:txBody>
+                    <a:bodyPr/>
+                    <a:lstStyle/>
+                    <a:p>
+                      <a:r>
+                        <a:rPr lang="de-DE" sz="1000">
                           <a:solidFill>
                             <a:schemeClr val="tx1"/>
                           </a:solidFill>
                         </a:rPr>
-                        <a:t>MATR currently does not respond with an error (issue already opened)</a:t>
-                      </a:r>
-                    </a:p>
-                  </a:txBody>
-                  <a:tcPr/>
-                </a:tc>
-                <a:extLst>
-                  <a:ext uri="{0D108BD9-81ED-4DB2-BD59-A6C34878D82A}">
-                    <a16:rowId xmlns:a16="http://schemas.microsoft.com/office/drawing/2014/main" val="816481573"/>
-                  </a:ext>
-                </a:extLst>
-              </a:tr>
-              <a:tr h="370840">
-                <a:tc>
-                  <a:txBody>
-                    <a:bodyPr/>
-                    <a:lstStyle/>
-                    <a:p>
-                      <a:r>
-                        <a:rPr lang="de-DE" sz="1200">
+                        <a:t>MATR returns a 415, unsupported media type, in NEP this should be 400</a:t>
+                      </a:r>
+                    </a:p>
+                  </a:txBody>
+                  <a:tcPr/>
+                </a:tc>
+                <a:tc>
+                  <a:txBody>
+                    <a:bodyPr/>
+                    <a:lstStyle/>
+                    <a:p>
+                      <a:r>
+                        <a:rPr lang="de-DE" sz="1000">
                           <a:solidFill>
                             <a:schemeClr val="tx1"/>
                           </a:solidFill>
                         </a:rPr>
-                        <a:t>requestBody missing</a:t>
-                      </a:r>
-                    </a:p>
-                  </a:txBody>
-                  <a:tcPr/>
-                </a:tc>
-                <a:tc>
-                  <a:txBody>
-                    <a:bodyPr/>
-                    <a:lstStyle/>
-                    <a:p>
-                      <a:r>
-                        <a:rPr lang="de-DE" sz="1200">
-                          <a:solidFill>
-                            <a:schemeClr val="tx1"/>
-                          </a:solidFill>
-                        </a:rPr>
-                        <a:t>requestBody required, but missing</a:t>
-                      </a:r>
-                    </a:p>
-                  </a:txBody>
-                  <a:tcPr/>
-                </a:tc>
-                <a:tc>
-                  <a:txBody>
-                    <a:bodyPr/>
-                    <a:lstStyle/>
-                    <a:p>
-                      <a:r>
-                        <a:rPr lang="de-DE" sz="1200">
-                          <a:solidFill>
-                            <a:srgbClr val="C00000"/>
-                          </a:solidFill>
-                        </a:rPr>
-                        <a:t>400</a:t>
-                      </a:r>
-                    </a:p>
-                  </a:txBody>
-                  <a:tcPr/>
-                </a:tc>
-                <a:tc>
-                  <a:txBody>
-                    <a:bodyPr/>
-                    <a:lstStyle/>
-                    <a:p>
-                      <a:r>
-                        <a:rPr lang="de-DE" sz="1200">
-                          <a:solidFill>
-                            <a:schemeClr val="tx1"/>
-                          </a:solidFill>
-                        </a:rPr>
-                        <a:t>Bad request</a:t>
-                      </a:r>
-                    </a:p>
-                    <a:p>
-                      <a:r>
-                        <a:rPr lang="de-DE" sz="1200">
-                          <a:solidFill>
-                            <a:schemeClr val="tx1"/>
-                          </a:solidFill>
-                        </a:rPr>
-                        <a:t>„missing requestBody“</a:t>
-                      </a:r>
-                    </a:p>
-                  </a:txBody>
-                  <a:tcPr/>
-                </a:tc>
-                <a:tc>
-                  <a:txBody>
-                    <a:bodyPr/>
-                    <a:lstStyle/>
-                    <a:p>
-                      <a:r>
-                        <a:rPr lang="de-DE" sz="1200">
-                          <a:solidFill>
-                            <a:schemeClr val="tx1"/>
-                          </a:solidFill>
-                        </a:rPr>
-                        <a:t>MATR returns a 415, unsupported media type, in NEP this should be 400 to indicate a client error</a:t>
+                        <a:t>Client (NEP)</a:t>
                       </a:r>
                     </a:p>
                   </a:txBody>
@@ -6088,11 +6203,163 @@
                     <a:lstStyle/>
                     <a:p>
                       <a:r>
-                        <a:rPr lang="de-DE" sz="1200">
+                        <a:rPr lang="de-DE" sz="1000">
                           <a:solidFill>
                             <a:schemeClr val="tx1"/>
                           </a:solidFill>
                         </a:rPr>
+                        <a:t>Invalid requestBody</a:t>
+                      </a:r>
+                    </a:p>
+                  </a:txBody>
+                  <a:tcPr/>
+                </a:tc>
+                <a:tc>
+                  <a:txBody>
+                    <a:bodyPr/>
+                    <a:lstStyle/>
+                    <a:p>
+                      <a:pPr marL="171450" indent="-171450">
+                        <a:buFont typeface="Arial" panose="020B0604020202020204" pitchFamily="34" charset="0"/>
+                        <a:buChar char="•"/>
+                      </a:pPr>
+                      <a:r>
+                        <a:rPr lang="de-DE" sz="1000">
+                          <a:solidFill>
+                            <a:schemeClr val="tx1"/>
+                          </a:solidFill>
+                        </a:rPr>
+                        <a:t>requestorProtocol not „HTTP“ or „HTTPS“</a:t>
+                      </a:r>
+                    </a:p>
+                    <a:p>
+                      <a:pPr marL="171450" indent="-171450">
+                        <a:buFont typeface="Arial" panose="020B0604020202020204" pitchFamily="34" charset="0"/>
+                        <a:buChar char="•"/>
+                      </a:pPr>
+                      <a:r>
+                        <a:rPr lang="de-DE" sz="1000">
+                          <a:solidFill>
+                            <a:schemeClr val="tx1"/>
+                          </a:solidFill>
+                        </a:rPr>
+                        <a:t>Invalid IP address format</a:t>
+                      </a:r>
+                    </a:p>
+                    <a:p>
+                      <a:pPr marL="171450" indent="-171450">
+                        <a:buFont typeface="Arial" panose="020B0604020202020204" pitchFamily="34" charset="0"/>
+                        <a:buChar char="•"/>
+                      </a:pPr>
+                      <a:r>
+                        <a:rPr lang="de-DE" sz="1000">
+                          <a:solidFill>
+                            <a:schemeClr val="tx1"/>
+                          </a:solidFill>
+                        </a:rPr>
+                        <a:t>wrong attribute value types</a:t>
+                      </a:r>
+                    </a:p>
+                    <a:p>
+                      <a:pPr marL="171450" indent="-171450">
+                        <a:buFont typeface="Arial" panose="020B0604020202020204" pitchFamily="34" charset="0"/>
+                        <a:buChar char="•"/>
+                      </a:pPr>
+                      <a:r>
+                        <a:rPr lang="de-DE" sz="1000">
+                          <a:solidFill>
+                            <a:schemeClr val="tx1"/>
+                          </a:solidFill>
+                        </a:rPr>
+                        <a:t>Incomplete: required attribute missing</a:t>
+                      </a:r>
+                    </a:p>
+                  </a:txBody>
+                  <a:tcPr/>
+                </a:tc>
+                <a:tc>
+                  <a:txBody>
+                    <a:bodyPr/>
+                    <a:lstStyle/>
+                    <a:p>
+                      <a:r>
+                        <a:rPr lang="de-DE" sz="1000">
+                          <a:solidFill>
+                            <a:srgbClr val="C00000"/>
+                          </a:solidFill>
+                        </a:rPr>
+                        <a:t>400</a:t>
+                      </a:r>
+                    </a:p>
+                  </a:txBody>
+                  <a:tcPr/>
+                </a:tc>
+                <a:tc>
+                  <a:txBody>
+                    <a:bodyPr/>
+                    <a:lstStyle/>
+                    <a:p>
+                      <a:r>
+                        <a:rPr lang="de-DE" sz="1000">
+                          <a:solidFill>
+                            <a:schemeClr val="tx1"/>
+                          </a:solidFill>
+                        </a:rPr>
+                        <a:t>Bad request</a:t>
+                      </a:r>
+                    </a:p>
+                  </a:txBody>
+                  <a:tcPr/>
+                </a:tc>
+                <a:tc>
+                  <a:txBody>
+                    <a:bodyPr/>
+                    <a:lstStyle/>
+                    <a:p>
+                      <a:endParaRPr lang="de-DE" sz="1000">
+                        <a:solidFill>
+                          <a:schemeClr val="tx1"/>
+                        </a:solidFill>
+                      </a:endParaRPr>
+                    </a:p>
+                  </a:txBody>
+                  <a:tcPr/>
+                </a:tc>
+                <a:tc>
+                  <a:txBody>
+                    <a:bodyPr/>
+                    <a:lstStyle/>
+                    <a:p>
+                      <a:r>
+                        <a:rPr lang="de-DE" sz="1000">
+                          <a:solidFill>
+                            <a:schemeClr val="tx1"/>
+                          </a:solidFill>
+                        </a:rPr>
+                        <a:t>Client (NEP)</a:t>
+                      </a:r>
+                    </a:p>
+                  </a:txBody>
+                  <a:tcPr/>
+                </a:tc>
+                <a:extLst>
+                  <a:ext uri="{0D108BD9-81ED-4DB2-BD59-A6C34878D82A}">
+                    <a16:rowId xmlns:a16="http://schemas.microsoft.com/office/drawing/2014/main" val="3623724939"/>
+                  </a:ext>
+                </a:extLst>
+              </a:tr>
+              <a:tr h="370840">
+                <a:tc>
+                  <a:txBody>
+                    <a:bodyPr/>
+                    <a:lstStyle/>
+                    <a:p>
+                      <a:r>
+                        <a:rPr lang="de-DE" sz="1000">
+                          <a:solidFill>
+                            <a:schemeClr val="tx1"/>
+                          </a:solidFill>
+                        </a:rPr>
                         <a:t>requestBody with unknown/invalid mountName</a:t>
                       </a:r>
                     </a:p>
@@ -6105,7 +6372,7 @@
                     <a:lstStyle/>
                     <a:p>
                       <a:r>
-                        <a:rPr lang="de-DE" sz="1200">
+                        <a:rPr lang="de-DE" sz="1000">
                           <a:solidFill>
                             <a:schemeClr val="tx1"/>
                           </a:solidFill>
@@ -6122,7 +6389,7 @@
                     <a:lstStyle/>
                     <a:p>
                       <a:r>
-                        <a:rPr lang="de-DE" sz="1200">
+                        <a:rPr lang="de-DE" sz="1000">
                           <a:solidFill>
                             <a:srgbClr val="C00000"/>
                           </a:solidFill>
@@ -6139,7 +6406,7 @@
                     <a:lstStyle/>
                     <a:p>
                       <a:r>
-                        <a:rPr lang="de-DE" sz="1200">
+                        <a:rPr lang="de-DE" sz="1000">
                           <a:solidFill>
                             <a:schemeClr val="tx1"/>
                           </a:solidFill>
@@ -6147,14 +6414,14 @@
                         <a:t>Not found</a:t>
                       </a:r>
                       <a:br>
-                        <a:rPr lang="de-DE" sz="1200">
+                        <a:rPr lang="de-DE" sz="1000">
                           <a:solidFill>
                             <a:schemeClr val="tx1"/>
                           </a:solidFill>
                         </a:rPr>
                       </a:br>
                       <a:r>
-                        <a:rPr lang="de-DE" sz="1200">
+                        <a:rPr lang="de-DE" sz="1000">
                           <a:solidFill>
                             <a:schemeClr val="tx1"/>
                           </a:solidFill>
@@ -6171,12 +6438,39 @@
                     <a:lstStyle/>
                     <a:p>
                       <a:r>
-                        <a:rPr lang="de-DE" sz="1200">
+                        <a:rPr lang="de-DE" sz="1000">
                           <a:solidFill>
                             <a:schemeClr val="tx1"/>
                           </a:solidFill>
                         </a:rPr>
                         <a:t>MATR currently returns a 500, there‘s an open issue to change it to 404</a:t>
+                      </a:r>
+                    </a:p>
+                    <a:p>
+                      <a:r>
+                        <a:rPr lang="de-DE" sz="1000">
+                          <a:solidFill>
+                            <a:schemeClr val="tx1"/>
+                          </a:solidFill>
+                        </a:rPr>
+                        <a:t>Server (MATR) error</a:t>
+                      </a:r>
+                    </a:p>
+                  </a:txBody>
+                  <a:tcPr/>
+                </a:tc>
+                <a:tc>
+                  <a:txBody>
+                    <a:bodyPr/>
+                    <a:lstStyle/>
+                    <a:p>
+                      <a:r>
+                        <a:rPr lang="de-DE" sz="1000">
+                          <a:solidFill>
+                            <a:schemeClr val="tx1"/>
+                          </a:solidFill>
+                        </a:rPr>
+                        <a:t>Server (MATR)</a:t>
                       </a:r>
                     </a:p>
                   </a:txBody>
@@ -6195,7 +6489,7 @@
                     <a:lstStyle/>
                     <a:p>
                       <a:r>
-                        <a:rPr lang="de-DE" sz="1200">
+                        <a:rPr lang="de-DE" sz="1000">
                           <a:solidFill>
                             <a:schemeClr val="tx1"/>
                           </a:solidFill>
@@ -6203,7 +6497,7 @@
                         <a:t>Valid request, but </a:t>
                       </a:r>
                       <a:r>
-                        <a:rPr lang="de-DE" sz="1200">
+                        <a:rPr lang="de-DE" sz="1000">
                           <a:solidFill>
                             <a:srgbClr val="C00000"/>
                           </a:solidFill>
@@ -6220,7 +6514,7 @@
                     <a:lstStyle/>
                     <a:p>
                       <a:r>
-                        <a:rPr lang="de-DE" sz="1200">
+                        <a:rPr lang="de-DE" sz="1000">
                           <a:solidFill>
                             <a:schemeClr val="tx1"/>
                           </a:solidFill>
@@ -6237,7 +6531,7 @@
                     <a:lstStyle/>
                     <a:p>
                       <a:r>
-                        <a:rPr lang="de-DE" sz="1200">
+                        <a:rPr lang="de-DE" sz="1000">
                           <a:solidFill>
                             <a:srgbClr val="C00000"/>
                           </a:solidFill>
@@ -6254,7 +6548,7 @@
                     <a:lstStyle/>
                     <a:p>
                       <a:r>
-                        <a:rPr lang="de-DE" sz="1200">
+                        <a:rPr lang="de-DE" sz="1000">
                           <a:solidFill>
                             <a:schemeClr val="tx1"/>
                           </a:solidFill>
@@ -6271,12 +6565,29 @@
                     <a:lstStyle/>
                     <a:p>
                       <a:r>
-                        <a:rPr lang="de-DE" sz="1200">
+                        <a:rPr lang="de-DE" sz="1000">
                           <a:solidFill>
                             <a:schemeClr val="tx1"/>
                           </a:solidFill>
                         </a:rPr>
                         <a:t>Some internal NEP error</a:t>
+                      </a:r>
+                    </a:p>
+                  </a:txBody>
+                  <a:tcPr/>
+                </a:tc>
+                <a:tc>
+                  <a:txBody>
+                    <a:bodyPr/>
+                    <a:lstStyle/>
+                    <a:p>
+                      <a:r>
+                        <a:rPr lang="de-DE" sz="1000">
+                          <a:solidFill>
+                            <a:schemeClr val="tx1"/>
+                          </a:solidFill>
+                        </a:rPr>
+                        <a:t>Client (NEP)</a:t>
                       </a:r>
                     </a:p>
                   </a:txBody>
@@ -6295,7 +6606,7 @@
                     <a:lstStyle/>
                     <a:p>
                       <a:r>
-                        <a:rPr lang="de-DE" sz="1200">
+                        <a:rPr lang="de-DE" sz="1000">
                           <a:solidFill>
                             <a:schemeClr val="tx1"/>
                           </a:solidFill>
@@ -6303,7 +6614,7 @@
                         <a:t>Valid request, but </a:t>
                       </a:r>
                       <a:r>
-                        <a:rPr lang="de-DE" sz="1200">
+                        <a:rPr lang="de-DE" sz="1000">
                           <a:solidFill>
                             <a:srgbClr val="C00000"/>
                           </a:solidFill>
@@ -6320,7 +6631,7 @@
                     <a:lstStyle/>
                     <a:p>
                       <a:r>
-                        <a:rPr lang="de-DE" sz="1200">
+                        <a:rPr lang="de-DE" sz="1000">
                           <a:solidFill>
                             <a:schemeClr val="tx1"/>
                           </a:solidFill>
@@ -6337,7 +6648,7 @@
                     <a:lstStyle/>
                     <a:p>
                       <a:r>
-                        <a:rPr lang="de-DE" sz="1200">
+                        <a:rPr lang="de-DE" sz="1000">
                           <a:solidFill>
                             <a:srgbClr val="C00000"/>
                           </a:solidFill>
@@ -6354,7 +6665,7 @@
                     <a:lstStyle/>
                     <a:p>
                       <a:r>
-                        <a:rPr lang="de-DE" sz="1200">
+                        <a:rPr lang="de-DE" sz="1000">
                           <a:solidFill>
                             <a:schemeClr val="tx1"/>
                           </a:solidFill>
@@ -6371,12 +6682,29 @@
                     <a:lstStyle/>
                     <a:p>
                       <a:r>
-                        <a:rPr lang="de-DE" sz="1200">
+                        <a:rPr lang="de-DE" sz="1000">
                           <a:solidFill>
                             <a:schemeClr val="tx1"/>
                           </a:solidFill>
                         </a:rPr>
                         <a:t>e.g. MATR unavailable</a:t>
+                      </a:r>
+                    </a:p>
+                  </a:txBody>
+                  <a:tcPr/>
+                </a:tc>
+                <a:tc>
+                  <a:txBody>
+                    <a:bodyPr/>
+                    <a:lstStyle/>
+                    <a:p>
+                      <a:r>
+                        <a:rPr lang="de-DE" sz="1000">
+                          <a:solidFill>
+                            <a:schemeClr val="tx1"/>
+                          </a:solidFill>
+                        </a:rPr>
+                        <a:t>Server (MATR)</a:t>
                       </a:r>
                     </a:p>
                   </a:txBody>
@@ -6467,10 +6795,76 @@
           </a:p>
         </p:txBody>
       </p:sp>
+      <p:sp>
+        <p:nvSpPr>
+          <p:cNvPr id="3" name="Rechteck 2">
+            <a:extLst>
+              <a:ext uri="{FF2B5EF4-FFF2-40B4-BE49-F238E27FC236}">
+                <a16:creationId xmlns:a16="http://schemas.microsoft.com/office/drawing/2014/main" id="{6273F55F-806B-9315-C8F4-70C1096C5347}"/>
+              </a:ext>
+            </a:extLst>
+          </p:cNvPr>
+          <p:cNvSpPr/>
+          <p:nvPr/>
+        </p:nvSpPr>
+        <p:spPr>
+          <a:xfrm>
+            <a:off x="7970655" y="968990"/>
+            <a:ext cx="3395066" cy="724893"/>
+          </a:xfrm>
+          <a:prstGeom prst="rect">
+            <a:avLst/>
+          </a:prstGeom>
+        </p:spPr>
+        <p:style>
+          <a:lnRef idx="1">
+            <a:schemeClr val="accent3"/>
+          </a:lnRef>
+          <a:fillRef idx="2">
+            <a:schemeClr val="accent3"/>
+          </a:fillRef>
+          <a:effectRef idx="1">
+            <a:schemeClr val="accent3"/>
+          </a:effectRef>
+          <a:fontRef idx="minor">
+            <a:schemeClr val="dk1"/>
+          </a:fontRef>
+        </p:style>
+        <p:txBody>
+          <a:bodyPr rtlCol="0" anchor="ctr"/>
+          <a:lstStyle/>
+          <a:p>
+            <a:r>
+              <a:rPr lang="de-DE" sz="1000" i="1"/>
+              <a:t>Note on requestor-address:</a:t>
+            </a:r>
+          </a:p>
+          <a:p>
+            <a:pPr marL="171450" indent="-171450">
+              <a:buFont typeface="Arial" panose="020B0604020202020204" pitchFamily="34" charset="0"/>
+              <a:buChar char="•"/>
+            </a:pPr>
+            <a:r>
+              <a:rPr lang="de-DE" sz="1000" i="1"/>
+              <a:t>MATR either accepts a domain-name or an IP address </a:t>
+            </a:r>
+          </a:p>
+          <a:p>
+            <a:pPr marL="171450" indent="-171450">
+              <a:buFont typeface="Arial" panose="020B0604020202020204" pitchFamily="34" charset="0"/>
+              <a:buChar char="•"/>
+            </a:pPr>
+            <a:r>
+              <a:rPr lang="de-DE" sz="1000" i="1"/>
+              <a:t>In NEP only IP address is to be used (i.e. Netexplorer must always call the service with the IP address)</a:t>
+            </a:r>
+          </a:p>
+        </p:txBody>
+      </p:sp>
     </p:spTree>
     <p:extLst>
       <p:ext uri="{BB962C8B-B14F-4D97-AF65-F5344CB8AC3E}">
-        <p14:creationId xmlns:p14="http://schemas.microsoft.com/office/powerpoint/2010/main" val="2054235506"/>
+        <p14:creationId xmlns:p14="http://schemas.microsoft.com/office/powerpoint/2010/main" val="2019449332"/>
       </p:ext>
     </p:extLst>
   </p:cSld>
@@ -6641,14 +7035,14 @@
           <p:nvPr>
             <p:extLst>
               <p:ext uri="{D42A27DB-BD31-4B8C-83A1-F6EECF244321}">
-                <p14:modId xmlns:p14="http://schemas.microsoft.com/office/powerpoint/2010/main" val="368601310"/>
+                <p14:modId xmlns:p14="http://schemas.microsoft.com/office/powerpoint/2010/main" val="3052514573"/>
               </p:ext>
             </p:extLst>
           </p:nvPr>
         </p:nvGraphicFramePr>
         <p:xfrm>
-          <a:off x="838200" y="1825625"/>
-          <a:ext cx="10889740" cy="3515360"/>
+          <a:off x="456829" y="1905138"/>
+          <a:ext cx="10889742" cy="4150360"/>
         </p:xfrm>
         <a:graphic>
           <a:graphicData uri="http://schemas.openxmlformats.org/drawingml/2006/table">
@@ -6657,41 +7051,48 @@
                 <a:tableStyleId>{5C22544A-7EE6-4342-B048-85BDC9FD1C3A}</a:tableStyleId>
               </a:tblPr>
               <a:tblGrid>
-                <a:gridCol w="2177948">
+                <a:gridCol w="1814957">
                   <a:extLst>
                     <a:ext uri="{9D8B030D-6E8A-4147-A177-3AD203B41FA5}">
                       <a16:colId xmlns:a16="http://schemas.microsoft.com/office/drawing/2014/main" val="3889186880"/>
                     </a:ext>
                   </a:extLst>
                 </a:gridCol>
-                <a:gridCol w="2177948">
+                <a:gridCol w="1814957">
                   <a:extLst>
                     <a:ext uri="{9D8B030D-6E8A-4147-A177-3AD203B41FA5}">
                       <a16:colId xmlns:a16="http://schemas.microsoft.com/office/drawing/2014/main" val="3012673204"/>
                     </a:ext>
                   </a:extLst>
                 </a:gridCol>
-                <a:gridCol w="2177948">
+                <a:gridCol w="1814957">
                   <a:extLst>
                     <a:ext uri="{9D8B030D-6E8A-4147-A177-3AD203B41FA5}">
                       <a16:colId xmlns:a16="http://schemas.microsoft.com/office/drawing/2014/main" val="304318035"/>
                     </a:ext>
                   </a:extLst>
                 </a:gridCol>
-                <a:gridCol w="2177948">
+                <a:gridCol w="1814957">
                   <a:extLst>
                     <a:ext uri="{9D8B030D-6E8A-4147-A177-3AD203B41FA5}">
                       <a16:colId xmlns:a16="http://schemas.microsoft.com/office/drawing/2014/main" val="603620899"/>
                     </a:ext>
                   </a:extLst>
                 </a:gridCol>
-                <a:gridCol w="2177948">
+                <a:gridCol w="1814957">
                   <a:extLst>
                     <a:ext uri="{9D8B030D-6E8A-4147-A177-3AD203B41FA5}">
                       <a16:colId xmlns:a16="http://schemas.microsoft.com/office/drawing/2014/main" val="241882064"/>
                     </a:ext>
                   </a:extLst>
                 </a:gridCol>
+                <a:gridCol w="1814957">
+                  <a:extLst>
+                    <a:ext uri="{9D8B030D-6E8A-4147-A177-3AD203B41FA5}">
+                      <a16:colId xmlns:a16="http://schemas.microsoft.com/office/drawing/2014/main" val="464889822"/>
+                    </a:ext>
+                  </a:extLst>
+                </a:gridCol>
               </a:tblGrid>
               <a:tr h="0">
                 <a:tc>
@@ -6754,6 +7155,19 @@
                       <a:r>
                         <a:rPr lang="de-DE" sz="1400"/>
                         <a:t>Info</a:t>
+                      </a:r>
+                    </a:p>
+                  </a:txBody>
+                  <a:tcPr/>
+                </a:tc>
+                <a:tc>
+                  <a:txBody>
+                    <a:bodyPr/>
+                    <a:lstStyle/>
+                    <a:p>
+                      <a:r>
+                        <a:rPr lang="de-DE" sz="1400"/>
+                        <a:t>Client / Server error</a:t>
                       </a:r>
                     </a:p>
                   </a:txBody>
@@ -6847,6 +7261,20 @@
                   </a:txBody>
                   <a:tcPr/>
                 </a:tc>
+                <a:tc>
+                  <a:txBody>
+                    <a:bodyPr/>
+                    <a:lstStyle/>
+                    <a:p>
+                      <a:endParaRPr lang="de-DE" sz="1200" i="1">
+                        <a:solidFill>
+                          <a:schemeClr val="tx1"/>
+                        </a:solidFill>
+                      </a:endParaRPr>
+                    </a:p>
+                  </a:txBody>
+                  <a:tcPr/>
+                </a:tc>
                 <a:extLst>
                   <a:ext uri="{0D108BD9-81ED-4DB2-BD59-A6C34878D82A}">
                     <a16:rowId xmlns:a16="http://schemas.microsoft.com/office/drawing/2014/main" val="1558608163"/>
@@ -6940,6 +7368,20 @@
                   </a:txBody>
                   <a:tcPr/>
                 </a:tc>
+                <a:tc>
+                  <a:txBody>
+                    <a:bodyPr/>
+                    <a:lstStyle/>
+                    <a:p>
+                      <a:endParaRPr lang="de-DE" sz="1200" i="1">
+                        <a:solidFill>
+                          <a:schemeClr val="tx1"/>
+                        </a:solidFill>
+                      </a:endParaRPr>
+                    </a:p>
+                  </a:txBody>
+                  <a:tcPr/>
+                </a:tc>
                 <a:extLst>
                   <a:ext uri="{0D108BD9-81ED-4DB2-BD59-A6C34878D82A}">
                     <a16:rowId xmlns:a16="http://schemas.microsoft.com/office/drawing/2014/main" val="483862774"/>
@@ -7037,6 +7479,23 @@
                           </a:solidFill>
                         </a:rPr>
                         <a:t>(*)</a:t>
+                      </a:r>
+                    </a:p>
+                  </a:txBody>
+                  <a:tcPr/>
+                </a:tc>
+                <a:tc>
+                  <a:txBody>
+                    <a:bodyPr/>
+                    <a:lstStyle/>
+                    <a:p>
+                      <a:r>
+                        <a:rPr lang="de-DE" sz="1200">
+                          <a:solidFill>
+                            <a:schemeClr val="tx1"/>
+                          </a:solidFill>
+                        </a:rPr>
+                        <a:t>Client (NEP)</a:t>
                       </a:r>
                     </a:p>
                   </a:txBody>
@@ -7161,6 +7620,40 @@
                   </a:txBody>
                   <a:tcPr/>
                 </a:tc>
+                <a:tc>
+                  <a:txBody>
+                    <a:bodyPr/>
+                    <a:lstStyle/>
+                    <a:p>
+                      <a:pPr marL="0" marR="0" lvl="0" indent="0" algn="l" defTabSz="914400" rtl="0" eaLnBrk="1" fontAlgn="auto" latinLnBrk="0" hangingPunct="1">
+                        <a:lnSpc>
+                          <a:spcPct val="100000"/>
+                        </a:lnSpc>
+                        <a:spcBef>
+                          <a:spcPts val="0"/>
+                        </a:spcBef>
+                        <a:spcAft>
+                          <a:spcPts val="0"/>
+                        </a:spcAft>
+                        <a:buClrTx/>
+                        <a:buSzTx/>
+                        <a:buFontTx/>
+                        <a:buNone/>
+                        <a:tabLst/>
+                        <a:defRPr/>
+                      </a:pPr>
+                      <a:r>
+                        <a:rPr lang="de-DE" sz="1200">
+                          <a:solidFill>
+                            <a:schemeClr val="tx1"/>
+                          </a:solidFill>
+                        </a:rPr>
+                        <a:t>Client (NEP)</a:t>
+                      </a:r>
+                    </a:p>
+                  </a:txBody>
+                  <a:tcPr/>
+                </a:tc>
                 <a:extLst>
                   <a:ext uri="{0D108BD9-81ED-4DB2-BD59-A6C34878D82A}">
                     <a16:rowId xmlns:a16="http://schemas.microsoft.com/office/drawing/2014/main" val="1711514898"/>
@@ -7263,6 +7756,23 @@
                   </a:txBody>
                   <a:tcPr/>
                 </a:tc>
+                <a:tc>
+                  <a:txBody>
+                    <a:bodyPr/>
+                    <a:lstStyle/>
+                    <a:p>
+                      <a:r>
+                        <a:rPr lang="de-DE" sz="1200">
+                          <a:solidFill>
+                            <a:schemeClr val="tx1"/>
+                          </a:solidFill>
+                        </a:rPr>
+                        <a:t>Server (MATR)</a:t>
+                      </a:r>
+                    </a:p>
+                  </a:txBody>
+                  <a:tcPr/>
+                </a:tc>
                 <a:extLst>
                   <a:ext uri="{0D108BD9-81ED-4DB2-BD59-A6C34878D82A}">
                     <a16:rowId xmlns:a16="http://schemas.microsoft.com/office/drawing/2014/main" val="1851629258"/>
@@ -7363,6 +7873,23 @@
                   </a:txBody>
                   <a:tcPr/>
                 </a:tc>
+                <a:tc>
+                  <a:txBody>
+                    <a:bodyPr/>
+                    <a:lstStyle/>
+                    <a:p>
+                      <a:r>
+                        <a:rPr lang="de-DE" sz="1200">
+                          <a:solidFill>
+                            <a:schemeClr val="tx1"/>
+                          </a:solidFill>
+                        </a:rPr>
+                        <a:t>Client (NEP)</a:t>
+                      </a:r>
+                    </a:p>
+                  </a:txBody>
+                  <a:tcPr/>
+                </a:tc>
                 <a:extLst>
                   <a:ext uri="{0D108BD9-81ED-4DB2-BD59-A6C34878D82A}">
                     <a16:rowId xmlns:a16="http://schemas.microsoft.com/office/drawing/2014/main" val="3776332936"/>
@@ -7458,6 +7985,23 @@
                           </a:solidFill>
                         </a:rPr>
                         <a:t>e.g. MATR unavailable</a:t>
+                      </a:r>
+                    </a:p>
+                  </a:txBody>
+                  <a:tcPr/>
+                </a:tc>
+                <a:tc>
+                  <a:txBody>
+                    <a:bodyPr/>
+                    <a:lstStyle/>
+                    <a:p>
+                      <a:r>
+                        <a:rPr lang="de-DE" sz="1200">
+                          <a:solidFill>
+                            <a:schemeClr val="tx1"/>
+                          </a:solidFill>
+                        </a:rPr>
+                        <a:t>Server (MATR)</a:t>
                       </a:r>
                     </a:p>
                   </a:txBody>

</xml_diff>

<commit_message>
Update responseCode mappings (#38)
Fixes #36
</commit_message>
<xml_diff>
--- a/spec/additionalDescription/sources/NEP ErrorCodes.pptx
+++ b/spec/additionalDescription/sources/NEP ErrorCodes.pptx
@@ -8,7 +8,7 @@
     <p:sldId id="256" r:id="rId2"/>
     <p:sldId id="257" r:id="rId3"/>
     <p:sldId id="258" r:id="rId4"/>
-    <p:sldId id="259" r:id="rId5"/>
+    <p:sldId id="261" r:id="rId5"/>
     <p:sldId id="260" r:id="rId6"/>
   </p:sldIdLst>
   <p:sldSz cx="12192000" cy="6858000"/>
@@ -263,7 +263,7 @@
           <a:p>
             <a:fld id="{2122B19E-09EC-44A4-9188-1701461FF1B9}" type="datetimeFigureOut">
               <a:rPr lang="de-DE" smtClean="0"/>
-              <a:t>15.07.2024</a:t>
+              <a:t>24.07.2024</a:t>
             </a:fld>
             <a:endParaRPr lang="de-DE"/>
           </a:p>
@@ -461,7 +461,7 @@
           <a:p>
             <a:fld id="{2122B19E-09EC-44A4-9188-1701461FF1B9}" type="datetimeFigureOut">
               <a:rPr lang="de-DE" smtClean="0"/>
-              <a:t>15.07.2024</a:t>
+              <a:t>24.07.2024</a:t>
             </a:fld>
             <a:endParaRPr lang="de-DE"/>
           </a:p>
@@ -669,7 +669,7 @@
           <a:p>
             <a:fld id="{2122B19E-09EC-44A4-9188-1701461FF1B9}" type="datetimeFigureOut">
               <a:rPr lang="de-DE" smtClean="0"/>
-              <a:t>15.07.2024</a:t>
+              <a:t>24.07.2024</a:t>
             </a:fld>
             <a:endParaRPr lang="de-DE"/>
           </a:p>
@@ -867,7 +867,7 @@
           <a:p>
             <a:fld id="{2122B19E-09EC-44A4-9188-1701461FF1B9}" type="datetimeFigureOut">
               <a:rPr lang="de-DE" smtClean="0"/>
-              <a:t>15.07.2024</a:t>
+              <a:t>24.07.2024</a:t>
             </a:fld>
             <a:endParaRPr lang="de-DE"/>
           </a:p>
@@ -1142,7 +1142,7 @@
           <a:p>
             <a:fld id="{2122B19E-09EC-44A4-9188-1701461FF1B9}" type="datetimeFigureOut">
               <a:rPr lang="de-DE" smtClean="0"/>
-              <a:t>15.07.2024</a:t>
+              <a:t>24.07.2024</a:t>
             </a:fld>
             <a:endParaRPr lang="de-DE"/>
           </a:p>
@@ -1407,7 +1407,7 @@
           <a:p>
             <a:fld id="{2122B19E-09EC-44A4-9188-1701461FF1B9}" type="datetimeFigureOut">
               <a:rPr lang="de-DE" smtClean="0"/>
-              <a:t>15.07.2024</a:t>
+              <a:t>24.07.2024</a:t>
             </a:fld>
             <a:endParaRPr lang="de-DE"/>
           </a:p>
@@ -1819,7 +1819,7 @@
           <a:p>
             <a:fld id="{2122B19E-09EC-44A4-9188-1701461FF1B9}" type="datetimeFigureOut">
               <a:rPr lang="de-DE" smtClean="0"/>
-              <a:t>15.07.2024</a:t>
+              <a:t>24.07.2024</a:t>
             </a:fld>
             <a:endParaRPr lang="de-DE"/>
           </a:p>
@@ -1960,7 +1960,7 @@
           <a:p>
             <a:fld id="{2122B19E-09EC-44A4-9188-1701461FF1B9}" type="datetimeFigureOut">
               <a:rPr lang="de-DE" smtClean="0"/>
-              <a:t>15.07.2024</a:t>
+              <a:t>24.07.2024</a:t>
             </a:fld>
             <a:endParaRPr lang="de-DE"/>
           </a:p>
@@ -2073,7 +2073,7 @@
           <a:p>
             <a:fld id="{2122B19E-09EC-44A4-9188-1701461FF1B9}" type="datetimeFigureOut">
               <a:rPr lang="de-DE" smtClean="0"/>
-              <a:t>15.07.2024</a:t>
+              <a:t>24.07.2024</a:t>
             </a:fld>
             <a:endParaRPr lang="de-DE"/>
           </a:p>
@@ -2384,7 +2384,7 @@
           <a:p>
             <a:fld id="{2122B19E-09EC-44A4-9188-1701461FF1B9}" type="datetimeFigureOut">
               <a:rPr lang="de-DE" smtClean="0"/>
-              <a:t>15.07.2024</a:t>
+              <a:t>24.07.2024</a:t>
             </a:fld>
             <a:endParaRPr lang="de-DE"/>
           </a:p>
@@ -2672,7 +2672,7 @@
           <a:p>
             <a:fld id="{2122B19E-09EC-44A4-9188-1701461FF1B9}" type="datetimeFigureOut">
               <a:rPr lang="de-DE" smtClean="0"/>
-              <a:t>15.07.2024</a:t>
+              <a:t>24.07.2024</a:t>
             </a:fld>
             <a:endParaRPr lang="de-DE"/>
           </a:p>
@@ -2913,7 +2913,7 @@
           <a:p>
             <a:fld id="{2122B19E-09EC-44A4-9188-1701461FF1B9}" type="datetimeFigureOut">
               <a:rPr lang="de-DE" smtClean="0"/>
-              <a:t>15.07.2024</a:t>
+              <a:t>24.07.2024</a:t>
             </a:fld>
             <a:endParaRPr lang="de-DE"/>
           </a:p>
@@ -3387,14 +3387,14 @@
           <p:nvPr>
             <p:extLst>
               <p:ext uri="{D42A27DB-BD31-4B8C-83A1-F6EECF244321}">
-                <p14:modId xmlns:p14="http://schemas.microsoft.com/office/powerpoint/2010/main" val="1803841417"/>
+                <p14:modId xmlns:p14="http://schemas.microsoft.com/office/powerpoint/2010/main" val="4005527021"/>
               </p:ext>
             </p:extLst>
           </p:nvPr>
         </p:nvGraphicFramePr>
         <p:xfrm>
           <a:off x="570295" y="1650826"/>
-          <a:ext cx="10889740" cy="2082800"/>
+          <a:ext cx="10889740" cy="2377440"/>
         </p:xfrm>
         <a:graphic>
           <a:graphicData uri="http://schemas.openxmlformats.org/drawingml/2006/table">
@@ -3767,6 +3767,12 @@
                         <a:t>Some internal NEP error</a:t>
                       </a:r>
                     </a:p>
+                    <a:p>
+                      <a:r>
+                        <a:rPr lang="de-DE" sz="1400"/>
+                        <a:t>Client error</a:t>
+                      </a:r>
+                    </a:p>
                   </a:txBody>
                   <a:tcPr/>
                 </a:tc>
@@ -3850,6 +3856,12 @@
                       <a:r>
                         <a:rPr lang="de-DE" sz="1400"/>
                         <a:t>e.g. MWDI unavailable</a:t>
+                      </a:r>
+                    </a:p>
+                    <a:p>
+                      <a:r>
+                        <a:rPr lang="de-DE" sz="1400"/>
+                        <a:t>Server error</a:t>
                       </a:r>
                     </a:p>
                   </a:txBody>
@@ -3999,14 +4011,14 @@
           <p:nvPr>
             <p:extLst>
               <p:ext uri="{D42A27DB-BD31-4B8C-83A1-F6EECF244321}">
-                <p14:modId xmlns:p14="http://schemas.microsoft.com/office/powerpoint/2010/main" val="1711679171"/>
+                <p14:modId xmlns:p14="http://schemas.microsoft.com/office/powerpoint/2010/main" val="309118415"/>
               </p:ext>
             </p:extLst>
           </p:nvPr>
         </p:nvGraphicFramePr>
         <p:xfrm>
           <a:off x="570295" y="1650826"/>
-          <a:ext cx="10889740" cy="1935480"/>
+          <a:ext cx="10889740" cy="2230120"/>
         </p:xfrm>
         <a:graphic>
           <a:graphicData uri="http://schemas.openxmlformats.org/drawingml/2006/table">
@@ -4360,6 +4372,12 @@
                         <a:t>Some internal NEP error</a:t>
                       </a:r>
                     </a:p>
+                    <a:p>
+                      <a:r>
+                        <a:rPr lang="de-DE" sz="1400"/>
+                        <a:t>Client error</a:t>
+                      </a:r>
+                    </a:p>
                   </a:txBody>
                   <a:tcPr/>
                 </a:tc>
@@ -4443,6 +4461,12 @@
                       <a:r>
                         <a:rPr lang="de-DE" sz="1400"/>
                         <a:t>e.g. MATR unavailable</a:t>
+                      </a:r>
+                    </a:p>
+                    <a:p>
+                      <a:r>
+                        <a:rPr lang="de-DE" sz="1400"/>
+                        <a:t>Server error</a:t>
                       </a:r>
                     </a:p>
                   </a:txBody>
@@ -4592,14 +4616,14 @@
           <p:nvPr>
             <p:extLst>
               <p:ext uri="{D42A27DB-BD31-4B8C-83A1-F6EECF244321}">
-                <p14:modId xmlns:p14="http://schemas.microsoft.com/office/powerpoint/2010/main" val="2533744590"/>
+                <p14:modId xmlns:p14="http://schemas.microsoft.com/office/powerpoint/2010/main" val="243660731"/>
               </p:ext>
             </p:extLst>
           </p:nvPr>
         </p:nvGraphicFramePr>
         <p:xfrm>
           <a:off x="570295" y="1650826"/>
-          <a:ext cx="10889740" cy="3733800"/>
+          <a:ext cx="10889741" cy="3469640"/>
         </p:xfrm>
         <a:graphic>
           <a:graphicData uri="http://schemas.openxmlformats.org/drawingml/2006/table">
@@ -4608,41 +4632,48 @@
                 <a:tableStyleId>{5C22544A-7EE6-4342-B048-85BDC9FD1C3A}</a:tableStyleId>
               </a:tblPr>
               <a:tblGrid>
-                <a:gridCol w="2177948">
+                <a:gridCol w="2395542">
                   <a:extLst>
                     <a:ext uri="{9D8B030D-6E8A-4147-A177-3AD203B41FA5}">
                       <a16:colId xmlns:a16="http://schemas.microsoft.com/office/drawing/2014/main" val="3666746875"/>
                     </a:ext>
                   </a:extLst>
                 </a:gridCol>
-                <a:gridCol w="2177948">
+                <a:gridCol w="1478942">
                   <a:extLst>
                     <a:ext uri="{9D8B030D-6E8A-4147-A177-3AD203B41FA5}">
                       <a16:colId xmlns:a16="http://schemas.microsoft.com/office/drawing/2014/main" val="4257571136"/>
                     </a:ext>
                   </a:extLst>
                 </a:gridCol>
-                <a:gridCol w="2177948">
+                <a:gridCol w="1057524">
                   <a:extLst>
                     <a:ext uri="{9D8B030D-6E8A-4147-A177-3AD203B41FA5}">
                       <a16:colId xmlns:a16="http://schemas.microsoft.com/office/drawing/2014/main" val="1965016822"/>
                     </a:ext>
                   </a:extLst>
                 </a:gridCol>
-                <a:gridCol w="2177948">
+                <a:gridCol w="2162754">
                   <a:extLst>
                     <a:ext uri="{9D8B030D-6E8A-4147-A177-3AD203B41FA5}">
                       <a16:colId xmlns:a16="http://schemas.microsoft.com/office/drawing/2014/main" val="2808797744"/>
                     </a:ext>
                   </a:extLst>
                 </a:gridCol>
-                <a:gridCol w="2177948">
+                <a:gridCol w="2480807">
                   <a:extLst>
                     <a:ext uri="{9D8B030D-6E8A-4147-A177-3AD203B41FA5}">
                       <a16:colId xmlns:a16="http://schemas.microsoft.com/office/drawing/2014/main" val="3854052125"/>
                     </a:ext>
                   </a:extLst>
                 </a:gridCol>
+                <a:gridCol w="1314172">
+                  <a:extLst>
+                    <a:ext uri="{9D8B030D-6E8A-4147-A177-3AD203B41FA5}">
+                      <a16:colId xmlns:a16="http://schemas.microsoft.com/office/drawing/2014/main" val="3775549604"/>
+                    </a:ext>
+                  </a:extLst>
+                </a:gridCol>
               </a:tblGrid>
               <a:tr h="0">
                 <a:tc>
@@ -4705,6 +4736,19 @@
                       <a:r>
                         <a:rPr lang="de-DE" sz="1100"/>
                         <a:t>Info</a:t>
+                      </a:r>
+                    </a:p>
+                  </a:txBody>
+                  <a:tcPr/>
+                </a:tc>
+                <a:tc>
+                  <a:txBody>
+                    <a:bodyPr/>
+                    <a:lstStyle/>
+                    <a:p>
+                      <a:r>
+                        <a:rPr lang="de-DE" sz="1100"/>
+                        <a:t>Client / Server error</a:t>
                       </a:r>
                     </a:p>
                   </a:txBody>
@@ -4786,8 +4830,18 @@
                     <a:p>
                       <a:r>
                         <a:rPr lang="de-DE" sz="1100"/>
-                        <a:t>mountName known by MATR</a:t>
-                      </a:r>
+                        <a:t>mountName known by MATR, mountName given as string</a:t>
+                      </a:r>
+                    </a:p>
+                  </a:txBody>
+                  <a:tcPr/>
+                </a:tc>
+                <a:tc>
+                  <a:txBody>
+                    <a:bodyPr/>
+                    <a:lstStyle/>
+                    <a:p>
+                      <a:endParaRPr lang="de-DE" sz="1100"/>
                     </a:p>
                   </a:txBody>
                   <a:tcPr/>
@@ -4902,171 +4956,6 @@
                   </a:txBody>
                   <a:tcPr/>
                 </a:tc>
-                <a:extLst>
-                  <a:ext uri="{0D108BD9-81ED-4DB2-BD59-A6C34878D82A}">
-                    <a16:rowId xmlns:a16="http://schemas.microsoft.com/office/drawing/2014/main" val="3635168493"/>
-                  </a:ext>
-                </a:extLst>
-              </a:tr>
-              <a:tr h="370840">
-                <a:tc>
-                  <a:txBody>
-                    <a:bodyPr/>
-                    <a:lstStyle/>
-                    <a:p>
-                      <a:r>
-                        <a:rPr lang="de-DE" sz="1100"/>
-                        <a:t>requestBody missing, </a:t>
-                      </a:r>
-                      <a:r>
-                        <a:rPr lang="de-DE" sz="1100">
-                          <a:solidFill>
-                            <a:srgbClr val="C00000"/>
-                          </a:solidFill>
-                        </a:rPr>
-                        <a:t>fail</a:t>
-                      </a:r>
-                      <a:endParaRPr lang="de-DE" sz="1100"/>
-                    </a:p>
-                  </a:txBody>
-                  <a:tcPr/>
-                </a:tc>
-                <a:tc>
-                  <a:txBody>
-                    <a:bodyPr/>
-                    <a:lstStyle/>
-                    <a:p>
-                      <a:r>
-                        <a:rPr lang="de-DE" sz="1100"/>
-                        <a:t>Required requestBody is missing</a:t>
-                      </a:r>
-                    </a:p>
-                  </a:txBody>
-                  <a:tcPr/>
-                </a:tc>
-                <a:tc>
-                  <a:txBody>
-                    <a:bodyPr/>
-                    <a:lstStyle/>
-                    <a:p>
-                      <a:r>
-                        <a:rPr lang="de-DE" sz="1100">
-                          <a:solidFill>
-                            <a:srgbClr val="C00000"/>
-                          </a:solidFill>
-                        </a:rPr>
-                        <a:t>400</a:t>
-                      </a:r>
-                    </a:p>
-                  </a:txBody>
-                  <a:tcPr/>
-                </a:tc>
-                <a:tc>
-                  <a:txBody>
-                    <a:bodyPr/>
-                    <a:lstStyle/>
-                    <a:p>
-                      <a:r>
-                        <a:rPr lang="de-DE" sz="1100"/>
-                        <a:t>Bad request</a:t>
-                      </a:r>
-                    </a:p>
-                  </a:txBody>
-                  <a:tcPr/>
-                </a:tc>
-                <a:tc>
-                  <a:txBody>
-                    <a:bodyPr/>
-                    <a:lstStyle/>
-                    <a:p>
-                      <a:r>
-                        <a:rPr lang="de-DE" sz="1100"/>
-                        <a:t>MATR returns a 415, unsupported media type, in NEP this should be 400 to indicate a client error</a:t>
-                      </a:r>
-                    </a:p>
-                  </a:txBody>
-                  <a:tcPr/>
-                </a:tc>
-                <a:extLst>
-                  <a:ext uri="{0D108BD9-81ED-4DB2-BD59-A6C34878D82A}">
-                    <a16:rowId xmlns:a16="http://schemas.microsoft.com/office/drawing/2014/main" val="1492686443"/>
-                  </a:ext>
-                </a:extLst>
-              </a:tr>
-              <a:tr h="370840">
-                <a:tc>
-                  <a:txBody>
-                    <a:bodyPr/>
-                    <a:lstStyle/>
-                    <a:p>
-                      <a:r>
-                        <a:rPr lang="de-DE" sz="1100">
-                          <a:solidFill>
-                            <a:schemeClr val="tx1"/>
-                          </a:solidFill>
-                        </a:rPr>
-                        <a:t>requestBody with missing mountName attribute, </a:t>
-                      </a:r>
-                      <a:r>
-                        <a:rPr lang="de-DE" sz="1100">
-                          <a:solidFill>
-                            <a:srgbClr val="C00000"/>
-                          </a:solidFill>
-                        </a:rPr>
-                        <a:t>fail</a:t>
-                      </a:r>
-                      <a:endParaRPr lang="de-DE" sz="1100">
-                        <a:solidFill>
-                          <a:schemeClr val="tx1"/>
-                        </a:solidFill>
-                      </a:endParaRPr>
-                    </a:p>
-                  </a:txBody>
-                  <a:tcPr/>
-                </a:tc>
-                <a:tc>
-                  <a:txBody>
-                    <a:bodyPr/>
-                    <a:lstStyle/>
-                    <a:p>
-                      <a:r>
-                        <a:rPr lang="de-DE" sz="1100"/>
-                        <a:t>Missing required parameter</a:t>
-                      </a:r>
-                    </a:p>
-                  </a:txBody>
-                  <a:tcPr/>
-                </a:tc>
-                <a:tc>
-                  <a:txBody>
-                    <a:bodyPr/>
-                    <a:lstStyle/>
-                    <a:p>
-                      <a:r>
-                        <a:rPr lang="de-DE" sz="1100">
-                          <a:solidFill>
-                            <a:srgbClr val="C00000"/>
-                          </a:solidFill>
-                        </a:rPr>
-                        <a:t>400</a:t>
-                      </a:r>
-                    </a:p>
-                  </a:txBody>
-                  <a:tcPr/>
-                </a:tc>
-                <a:tc>
-                  <a:txBody>
-                    <a:bodyPr/>
-                    <a:lstStyle/>
-                    <a:p>
-                      <a:r>
-                        <a:rPr lang="de-DE" sz="1100"/>
-                        <a:t>Bad request</a:t>
-                      </a:r>
-                    </a:p>
-                  </a:txBody>
-                  <a:tcPr/>
-                </a:tc>
                 <a:tc>
                   <a:txBody>
                     <a:bodyPr/>
@@ -5089,28 +4978,218 @@
                         <a:tabLst/>
                         <a:defRPr/>
                       </a:pPr>
-                      <a:r>
-                        <a:rPr lang="de-DE" sz="1100" kern="1200">
-                          <a:solidFill>
-                            <a:schemeClr val="dk1"/>
-                          </a:solidFill>
-                          <a:latin typeface="+mn-lt"/>
-                          <a:ea typeface="+mn-ea"/>
-                          <a:cs typeface="+mn-cs"/>
-                        </a:rPr>
-                        <a:t>MATR returns 400, </a:t>
-                      </a:r>
-                      <a:r>
-                        <a:rPr lang="en-US" sz="1050" i="1" kern="1200">
-                          <a:solidFill>
-                            <a:schemeClr val="dk1"/>
-                          </a:solidFill>
-                          <a:latin typeface="+mn-lt"/>
-                          <a:ea typeface="+mn-ea"/>
-                          <a:cs typeface="+mn-cs"/>
-                        </a:rPr>
-                        <a:t>"request.body should have required property 'mount-name'"</a:t>
-                      </a:r>
+                      <a:endParaRPr lang="en-US" sz="1100" kern="1200">
+                        <a:solidFill>
+                          <a:schemeClr val="dk1"/>
+                        </a:solidFill>
+                        <a:latin typeface="+mn-lt"/>
+                        <a:ea typeface="+mn-ea"/>
+                        <a:cs typeface="+mn-cs"/>
+                      </a:endParaRPr>
+                    </a:p>
+                  </a:txBody>
+                  <a:tcPr/>
+                </a:tc>
+                <a:extLst>
+                  <a:ext uri="{0D108BD9-81ED-4DB2-BD59-A6C34878D82A}">
+                    <a16:rowId xmlns:a16="http://schemas.microsoft.com/office/drawing/2014/main" val="3635168493"/>
+                  </a:ext>
+                </a:extLst>
+              </a:tr>
+              <a:tr h="370840">
+                <a:tc>
+                  <a:txBody>
+                    <a:bodyPr/>
+                    <a:lstStyle/>
+                    <a:p>
+                      <a:r>
+                        <a:rPr lang="de-DE" sz="1100"/>
+                        <a:t>requestBody missing, </a:t>
+                      </a:r>
+                      <a:r>
+                        <a:rPr lang="de-DE" sz="1100">
+                          <a:solidFill>
+                            <a:srgbClr val="C00000"/>
+                          </a:solidFill>
+                        </a:rPr>
+                        <a:t>fail</a:t>
+                      </a:r>
+                      <a:endParaRPr lang="de-DE" sz="1100"/>
+                    </a:p>
+                  </a:txBody>
+                  <a:tcPr/>
+                </a:tc>
+                <a:tc>
+                  <a:txBody>
+                    <a:bodyPr/>
+                    <a:lstStyle/>
+                    <a:p>
+                      <a:r>
+                        <a:rPr lang="de-DE" sz="1100"/>
+                        <a:t>Required requestBody is missing</a:t>
+                      </a:r>
+                    </a:p>
+                  </a:txBody>
+                  <a:tcPr/>
+                </a:tc>
+                <a:tc>
+                  <a:txBody>
+                    <a:bodyPr/>
+                    <a:lstStyle/>
+                    <a:p>
+                      <a:r>
+                        <a:rPr lang="de-DE" sz="1100">
+                          <a:solidFill>
+                            <a:srgbClr val="C00000"/>
+                          </a:solidFill>
+                        </a:rPr>
+                        <a:t>400</a:t>
+                      </a:r>
+                    </a:p>
+                  </a:txBody>
+                  <a:tcPr/>
+                </a:tc>
+                <a:tc>
+                  <a:txBody>
+                    <a:bodyPr/>
+                    <a:lstStyle/>
+                    <a:p>
+                      <a:r>
+                        <a:rPr lang="de-DE" sz="1100"/>
+                        <a:t>Bad request</a:t>
+                      </a:r>
+                    </a:p>
+                  </a:txBody>
+                  <a:tcPr/>
+                </a:tc>
+                <a:tc>
+                  <a:txBody>
+                    <a:bodyPr/>
+                    <a:lstStyle/>
+                    <a:p>
+                      <a:r>
+                        <a:rPr lang="de-DE" sz="1100"/>
+                        <a:t>MATR returns a 415, unsupported media type, in NEP this should be 400</a:t>
+                      </a:r>
+                    </a:p>
+                  </a:txBody>
+                  <a:tcPr/>
+                </a:tc>
+                <a:tc>
+                  <a:txBody>
+                    <a:bodyPr/>
+                    <a:lstStyle/>
+                    <a:p>
+                      <a:r>
+                        <a:rPr lang="de-DE" sz="1100"/>
+                        <a:t>Client (NEP)</a:t>
+                      </a:r>
+                    </a:p>
+                  </a:txBody>
+                  <a:tcPr/>
+                </a:tc>
+                <a:extLst>
+                  <a:ext uri="{0D108BD9-81ED-4DB2-BD59-A6C34878D82A}">
+                    <a16:rowId xmlns:a16="http://schemas.microsoft.com/office/drawing/2014/main" val="1492686443"/>
+                  </a:ext>
+                </a:extLst>
+              </a:tr>
+              <a:tr h="370840">
+                <a:tc>
+                  <a:txBody>
+                    <a:bodyPr/>
+                    <a:lstStyle/>
+                    <a:p>
+                      <a:r>
+                        <a:rPr lang="de-DE" sz="1100">
+                          <a:solidFill>
+                            <a:schemeClr val="tx1"/>
+                          </a:solidFill>
+                        </a:rPr>
+                        <a:t>requestBody with missing mountName attribute, </a:t>
+                      </a:r>
+                      <a:r>
+                        <a:rPr lang="de-DE" sz="1100">
+                          <a:solidFill>
+                            <a:srgbClr val="C00000"/>
+                          </a:solidFill>
+                        </a:rPr>
+                        <a:t>fail</a:t>
+                      </a:r>
+                      <a:endParaRPr lang="de-DE" sz="1100">
+                        <a:solidFill>
+                          <a:schemeClr val="tx1"/>
+                        </a:solidFill>
+                      </a:endParaRPr>
+                    </a:p>
+                  </a:txBody>
+                  <a:tcPr/>
+                </a:tc>
+                <a:tc>
+                  <a:txBody>
+                    <a:bodyPr/>
+                    <a:lstStyle/>
+                    <a:p>
+                      <a:r>
+                        <a:rPr lang="de-DE" sz="1100"/>
+                        <a:t>Missing required parameter</a:t>
+                      </a:r>
+                    </a:p>
+                  </a:txBody>
+                  <a:tcPr/>
+                </a:tc>
+                <a:tc>
+                  <a:txBody>
+                    <a:bodyPr/>
+                    <a:lstStyle/>
+                    <a:p>
+                      <a:r>
+                        <a:rPr lang="de-DE" sz="1100">
+                          <a:solidFill>
+                            <a:srgbClr val="C00000"/>
+                          </a:solidFill>
+                        </a:rPr>
+                        <a:t>400</a:t>
+                      </a:r>
+                    </a:p>
+                  </a:txBody>
+                  <a:tcPr/>
+                </a:tc>
+                <a:tc>
+                  <a:txBody>
+                    <a:bodyPr/>
+                    <a:lstStyle/>
+                    <a:p>
+                      <a:r>
+                        <a:rPr lang="de-DE" sz="1100"/>
+                        <a:t>Bad request</a:t>
+                      </a:r>
+                    </a:p>
+                  </a:txBody>
+                  <a:tcPr/>
+                </a:tc>
+                <a:tc>
+                  <a:txBody>
+                    <a:bodyPr/>
+                    <a:lstStyle/>
+                    <a:p>
+                      <a:pPr marL="0" marR="0" lvl="0" indent="0" algn="l" defTabSz="914400" rtl="0" eaLnBrk="1" fontAlgn="auto" latinLnBrk="0" hangingPunct="1">
+                        <a:lnSpc>
+                          <a:spcPct val="100000"/>
+                        </a:lnSpc>
+                        <a:spcBef>
+                          <a:spcPts val="0"/>
+                        </a:spcBef>
+                        <a:spcAft>
+                          <a:spcPts val="0"/>
+                        </a:spcAft>
+                        <a:buClrTx/>
+                        <a:buSzTx/>
+                        <a:buFontTx/>
+                        <a:buNone/>
+                        <a:tabLst/>
+                        <a:defRPr/>
+                      </a:pPr>
                       <a:endParaRPr lang="en-US" sz="1100" i="1" kern="1200">
                         <a:solidFill>
                           <a:schemeClr val="dk1"/>
@@ -5123,6 +5202,43 @@
                   </a:txBody>
                   <a:tcPr/>
                 </a:tc>
+                <a:tc>
+                  <a:txBody>
+                    <a:bodyPr/>
+                    <a:lstStyle/>
+                    <a:p>
+                      <a:pPr marL="0" marR="0" lvl="0" indent="0" algn="l" defTabSz="914400" rtl="0" eaLnBrk="1" fontAlgn="auto" latinLnBrk="0" hangingPunct="1">
+                        <a:lnSpc>
+                          <a:spcPct val="100000"/>
+                        </a:lnSpc>
+                        <a:spcBef>
+                          <a:spcPts val="0"/>
+                        </a:spcBef>
+                        <a:spcAft>
+                          <a:spcPts val="0"/>
+                        </a:spcAft>
+                        <a:buClrTx/>
+                        <a:buSzTx/>
+                        <a:buFontTx/>
+                        <a:buNone/>
+                        <a:tabLst/>
+                        <a:defRPr/>
+                      </a:pPr>
+                      <a:r>
+                        <a:rPr lang="en-US" sz="1100" i="0" kern="1200">
+                          <a:solidFill>
+                            <a:schemeClr val="dk1"/>
+                          </a:solidFill>
+                          <a:latin typeface="+mn-lt"/>
+                          <a:ea typeface="+mn-ea"/>
+                          <a:cs typeface="+mn-cs"/>
+                        </a:rPr>
+                        <a:t>Client (NEP)</a:t>
+                      </a:r>
+                    </a:p>
+                  </a:txBody>
+                  <a:tcPr/>
+                </a:tc>
                 <a:extLst>
                   <a:ext uri="{0D108BD9-81ED-4DB2-BD59-A6C34878D82A}">
                     <a16:rowId xmlns:a16="http://schemas.microsoft.com/office/drawing/2014/main" val="4092892697"/>
@@ -5194,10 +5310,7 @@
                       <a:br>
                         <a:rPr lang="de-DE" sz="1100"/>
                       </a:br>
-                      <a:r>
-                        <a:rPr lang="de-DE" sz="1100"/>
-                        <a:t>(message might be modified)</a:t>
-                      </a:r>
+                      <a:endParaRPr lang="de-DE" sz="1100"/>
                     </a:p>
                   </a:txBody>
                   <a:tcPr/>
@@ -5210,6 +5323,19 @@
                       <a:r>
                         <a:rPr lang="de-DE" sz="1100"/>
                         <a:t>MATR currently returns a 500, there‘s an open issue to change it to 404</a:t>
+                      </a:r>
+                    </a:p>
+                  </a:txBody>
+                  <a:tcPr/>
+                </a:tc>
+                <a:tc>
+                  <a:txBody>
+                    <a:bodyPr/>
+                    <a:lstStyle/>
+                    <a:p>
+                      <a:r>
+                        <a:rPr lang="de-DE" sz="1100"/>
+                        <a:t>Server (MATR)</a:t>
                       </a:r>
                     </a:p>
                   </a:txBody>
@@ -5300,6 +5426,19 @@
                   </a:txBody>
                   <a:tcPr/>
                 </a:tc>
+                <a:tc>
+                  <a:txBody>
+                    <a:bodyPr/>
+                    <a:lstStyle/>
+                    <a:p>
+                      <a:r>
+                        <a:rPr lang="de-DE" sz="1100"/>
+                        <a:t>Client (NEP)</a:t>
+                      </a:r>
+                    </a:p>
+                  </a:txBody>
+                  <a:tcPr/>
+                </a:tc>
                 <a:extLst>
                   <a:ext uri="{0D108BD9-81ED-4DB2-BD59-A6C34878D82A}">
                     <a16:rowId xmlns:a16="http://schemas.microsoft.com/office/drawing/2014/main" val="4107805488"/>
@@ -5380,6 +5519,19 @@
                       <a:r>
                         <a:rPr lang="de-DE" sz="1100"/>
                         <a:t>e.g. MATR unavailable</a:t>
+                      </a:r>
+                    </a:p>
+                  </a:txBody>
+                  <a:tcPr/>
+                </a:tc>
+                <a:tc>
+                  <a:txBody>
+                    <a:bodyPr/>
+                    <a:lstStyle/>
+                    <a:p>
+                      <a:r>
+                        <a:rPr lang="de-DE" sz="1100"/>
+                        <a:t>Server (MATR)</a:t>
                       </a:r>
                     </a:p>
                   </a:txBody>
@@ -5571,14 +5723,14 @@
           <p:nvPr>
             <p:extLst>
               <p:ext uri="{D42A27DB-BD31-4B8C-83A1-F6EECF244321}">
-                <p14:modId xmlns:p14="http://schemas.microsoft.com/office/powerpoint/2010/main" val="2905972266"/>
+                <p14:modId xmlns:p14="http://schemas.microsoft.com/office/powerpoint/2010/main" val="1424448471"/>
               </p:ext>
             </p:extLst>
           </p:nvPr>
         </p:nvGraphicFramePr>
         <p:xfrm>
           <a:off x="583644" y="1944502"/>
-          <a:ext cx="10889740" cy="4429760"/>
+          <a:ext cx="10889739" cy="4307840"/>
         </p:xfrm>
         <a:graphic>
           <a:graphicData uri="http://schemas.openxmlformats.org/drawingml/2006/table">
@@ -5587,41 +5739,48 @@
                 <a:tableStyleId>{5C22544A-7EE6-4342-B048-85BDC9FD1C3A}</a:tableStyleId>
               </a:tblPr>
               <a:tblGrid>
-                <a:gridCol w="2177948">
+                <a:gridCol w="1656651">
                   <a:extLst>
                     <a:ext uri="{9D8B030D-6E8A-4147-A177-3AD203B41FA5}">
                       <a16:colId xmlns:a16="http://schemas.microsoft.com/office/drawing/2014/main" val="3666746875"/>
                     </a:ext>
                   </a:extLst>
                 </a:gridCol>
-                <a:gridCol w="2177948">
+                <a:gridCol w="2124971">
                   <a:extLst>
                     <a:ext uri="{9D8B030D-6E8A-4147-A177-3AD203B41FA5}">
                       <a16:colId xmlns:a16="http://schemas.microsoft.com/office/drawing/2014/main" val="4257571136"/>
                     </a:ext>
                   </a:extLst>
                 </a:gridCol>
-                <a:gridCol w="2177948">
+                <a:gridCol w="1335819">
                   <a:extLst>
                     <a:ext uri="{9D8B030D-6E8A-4147-A177-3AD203B41FA5}">
                       <a16:colId xmlns:a16="http://schemas.microsoft.com/office/drawing/2014/main" val="1965016822"/>
                     </a:ext>
                   </a:extLst>
                 </a:gridCol>
-                <a:gridCol w="2177948">
+                <a:gridCol w="1820849">
                   <a:extLst>
                     <a:ext uri="{9D8B030D-6E8A-4147-A177-3AD203B41FA5}">
                       <a16:colId xmlns:a16="http://schemas.microsoft.com/office/drawing/2014/main" val="2808797744"/>
                     </a:ext>
                   </a:extLst>
                 </a:gridCol>
-                <a:gridCol w="2177948">
+                <a:gridCol w="2552369">
                   <a:extLst>
                     <a:ext uri="{9D8B030D-6E8A-4147-A177-3AD203B41FA5}">
                       <a16:colId xmlns:a16="http://schemas.microsoft.com/office/drawing/2014/main" val="3854052125"/>
                     </a:ext>
                   </a:extLst>
                 </a:gridCol>
+                <a:gridCol w="1399080">
+                  <a:extLst>
+                    <a:ext uri="{9D8B030D-6E8A-4147-A177-3AD203B41FA5}">
+                      <a16:colId xmlns:a16="http://schemas.microsoft.com/office/drawing/2014/main" val="3190374473"/>
+                    </a:ext>
+                  </a:extLst>
+                </a:gridCol>
               </a:tblGrid>
               <a:tr h="0">
                 <a:tc>
@@ -5684,6 +5843,19 @@
                       <a:r>
                         <a:rPr lang="de-DE" sz="1400"/>
                         <a:t>Info</a:t>
+                      </a:r>
+                    </a:p>
+                  </a:txBody>
+                  <a:tcPr/>
+                </a:tc>
+                <a:tc>
+                  <a:txBody>
+                    <a:bodyPr/>
+                    <a:lstStyle/>
+                    <a:p>
+                      <a:r>
+                        <a:rPr lang="de-DE" sz="1400"/>
+                        <a:t>Client / Server error</a:t>
                       </a:r>
                     </a:p>
                   </a:txBody>
@@ -5702,7 +5874,7 @@
                     <a:lstStyle/>
                     <a:p>
                       <a:r>
-                        <a:rPr lang="de-DE" sz="1200">
+                        <a:rPr lang="de-DE" sz="1000">
                           <a:solidFill>
                             <a:schemeClr val="tx1"/>
                           </a:solidFill>
@@ -5718,7 +5890,7 @@
                     <a:bodyPr/>
                     <a:lstStyle/>
                     <a:p>
-                      <a:endParaRPr lang="de-DE" sz="1200">
+                      <a:endParaRPr lang="de-DE" sz="1000">
                         <a:solidFill>
                           <a:schemeClr val="tx1"/>
                         </a:solidFill>
@@ -5733,7 +5905,7 @@
                     <a:lstStyle/>
                     <a:p>
                       <a:r>
-                        <a:rPr lang="de-DE" sz="1200">
+                        <a:rPr lang="de-DE" sz="1000">
                           <a:solidFill>
                             <a:schemeClr val="accent6">
                               <a:lumMod val="50000"/>
@@ -5752,7 +5924,7 @@
                     <a:lstStyle/>
                     <a:p>
                       <a:r>
-                        <a:rPr lang="de-DE" sz="1200">
+                        <a:rPr lang="de-DE" sz="1000">
                           <a:solidFill>
                             <a:schemeClr val="tx1"/>
                           </a:solidFill>
@@ -5769,13 +5941,27 @@
                     <a:lstStyle/>
                     <a:p>
                       <a:r>
-                        <a:rPr lang="de-DE" sz="1200">
+                        <a:rPr lang="de-DE" sz="1000">
                           <a:solidFill>
                             <a:schemeClr val="tx1"/>
                           </a:solidFill>
                         </a:rPr>
                         <a:t>MATR returns only requestId (processing can take a while)</a:t>
                       </a:r>
+                    </a:p>
+                  </a:txBody>
+                  <a:tcPr/>
+                </a:tc>
+                <a:tc>
+                  <a:txBody>
+                    <a:bodyPr/>
+                    <a:lstStyle/>
+                    <a:p>
+                      <a:endParaRPr lang="de-DE" sz="1000">
+                        <a:solidFill>
+                          <a:schemeClr val="tx1"/>
+                        </a:solidFill>
+                      </a:endParaRPr>
                     </a:p>
                   </a:txBody>
                   <a:tcPr/>
@@ -5793,7 +5979,7 @@
                     <a:lstStyle/>
                     <a:p>
                       <a:r>
-                        <a:rPr lang="de-DE" sz="1200">
+                        <a:rPr lang="de-DE" sz="1000">
                           <a:solidFill>
                             <a:schemeClr val="tx1"/>
                           </a:solidFill>
@@ -5809,7 +5995,7 @@
                     <a:bodyPr/>
                     <a:lstStyle/>
                     <a:p>
-                      <a:endParaRPr lang="de-DE" sz="1200">
+                      <a:endParaRPr lang="de-DE" sz="1000">
                         <a:solidFill>
                           <a:schemeClr val="tx1"/>
                         </a:solidFill>
@@ -5824,7 +6010,7 @@
                     <a:lstStyle/>
                     <a:p>
                       <a:r>
-                        <a:rPr lang="de-DE" sz="1200">
+                        <a:rPr lang="de-DE" sz="1000">
                           <a:solidFill>
                             <a:schemeClr val="accent6">
                               <a:lumMod val="50000"/>
@@ -5843,7 +6029,7 @@
                     <a:lstStyle/>
                     <a:p>
                       <a:r>
-                        <a:rPr lang="de-DE" sz="1200">
+                        <a:rPr lang="de-DE" sz="1000">
                           <a:solidFill>
                             <a:schemeClr val="tx1"/>
                           </a:solidFill>
@@ -5860,13 +6046,27 @@
                     <a:lstStyle/>
                     <a:p>
                       <a:r>
-                        <a:rPr lang="de-DE" sz="1200">
+                        <a:rPr lang="de-DE" sz="1000">
                           <a:solidFill>
                             <a:schemeClr val="tx1"/>
                           </a:solidFill>
                         </a:rPr>
                         <a:t>MATR ignores additional unneeded attributes, NEP can do the same</a:t>
                       </a:r>
+                    </a:p>
+                  </a:txBody>
+                  <a:tcPr/>
+                </a:tc>
+                <a:tc>
+                  <a:txBody>
+                    <a:bodyPr/>
+                    <a:lstStyle/>
+                    <a:p>
+                      <a:endParaRPr lang="de-DE" sz="1000">
+                        <a:solidFill>
+                          <a:schemeClr val="tx1"/>
+                        </a:solidFill>
+                      </a:endParaRPr>
                     </a:p>
                   </a:txBody>
                   <a:tcPr/>
@@ -5884,41 +6084,41 @@
                     <a:lstStyle/>
                     <a:p>
                       <a:r>
-                        <a:rPr lang="de-DE" sz="1200">
+                        <a:rPr lang="de-DE" sz="1000">
                           <a:solidFill>
                             <a:schemeClr val="tx1"/>
                           </a:solidFill>
                         </a:rPr>
-                        <a:t>Incomplete requestBody</a:t>
-                      </a:r>
-                    </a:p>
-                  </a:txBody>
-                  <a:tcPr/>
-                </a:tc>
-                <a:tc>
-                  <a:txBody>
-                    <a:bodyPr/>
-                    <a:lstStyle/>
-                    <a:p>
-                      <a:r>
-                        <a:rPr lang="de-DE" sz="1200">
+                        <a:t>requestBody missing</a:t>
+                      </a:r>
+                    </a:p>
+                  </a:txBody>
+                  <a:tcPr/>
+                </a:tc>
+                <a:tc>
+                  <a:txBody>
+                    <a:bodyPr/>
+                    <a:lstStyle/>
+                    <a:p>
+                      <a:r>
+                        <a:rPr lang="de-DE" sz="1000">
                           <a:solidFill>
                             <a:schemeClr val="tx1"/>
                           </a:solidFill>
                         </a:rPr>
-                        <a:t>Incomplete requestBody: complete info needed, as otherwise NEP cannot send answer to Netexplorer</a:t>
-                      </a:r>
-                    </a:p>
-                  </a:txBody>
-                  <a:tcPr/>
-                </a:tc>
-                <a:tc>
-                  <a:txBody>
-                    <a:bodyPr/>
-                    <a:lstStyle/>
-                    <a:p>
-                      <a:r>
-                        <a:rPr lang="de-DE" sz="1200">
+                        <a:t>requestBody required, but missing</a:t>
+                      </a:r>
+                    </a:p>
+                  </a:txBody>
+                  <a:tcPr/>
+                </a:tc>
+                <a:tc>
+                  <a:txBody>
+                    <a:bodyPr/>
+                    <a:lstStyle/>
+                    <a:p>
+                      <a:r>
+                        <a:rPr lang="de-DE" sz="1000">
                           <a:solidFill>
                             <a:srgbClr val="C00000"/>
                           </a:solidFill>
@@ -5935,7 +6135,7 @@
                     <a:lstStyle/>
                     <a:p>
                       <a:r>
-                        <a:rPr lang="de-DE" sz="1200">
+                        <a:rPr lang="de-DE" sz="1000">
                           <a:solidFill>
                             <a:schemeClr val="tx1"/>
                           </a:solidFill>
@@ -5945,131 +6145,46 @@
                     </a:p>
                     <a:p>
                       <a:r>
-                        <a:rPr lang="de-DE" sz="1200">
+                        <a:rPr lang="de-DE" sz="1000">
                           <a:solidFill>
                             <a:schemeClr val="tx1"/>
                           </a:solidFill>
                         </a:rPr>
-                        <a:t>„incomplete requestBody“</a:t>
-                      </a:r>
-                    </a:p>
-                  </a:txBody>
-                  <a:tcPr/>
-                </a:tc>
-                <a:tc>
-                  <a:txBody>
-                    <a:bodyPr/>
-                    <a:lstStyle/>
-                    <a:p>
-                      <a:r>
-                        <a:rPr lang="de-DE" sz="1200">
+                        <a:t>„missing requestBody“</a:t>
+                      </a:r>
+                    </a:p>
+                  </a:txBody>
+                  <a:tcPr/>
+                </a:tc>
+                <a:tc>
+                  <a:txBody>
+                    <a:bodyPr/>
+                    <a:lstStyle/>
+                    <a:p>
+                      <a:r>
+                        <a:rPr lang="de-DE" sz="1000">
                           <a:solidFill>
                             <a:schemeClr val="tx1"/>
                           </a:solidFill>
                         </a:rPr>
-                        <a:t>MATR currently does not respond with an error (issue already opened)</a:t>
-                      </a:r>
-                    </a:p>
-                  </a:txBody>
-                  <a:tcPr/>
-                </a:tc>
-                <a:extLst>
-                  <a:ext uri="{0D108BD9-81ED-4DB2-BD59-A6C34878D82A}">
-                    <a16:rowId xmlns:a16="http://schemas.microsoft.com/office/drawing/2014/main" val="816481573"/>
-                  </a:ext>
-                </a:extLst>
-              </a:tr>
-              <a:tr h="370840">
-                <a:tc>
-                  <a:txBody>
-                    <a:bodyPr/>
-                    <a:lstStyle/>
-                    <a:p>
-                      <a:r>
-                        <a:rPr lang="de-DE" sz="1200">
+                        <a:t>MATR returns a 415, unsupported media type, in NEP this should be 400</a:t>
+                      </a:r>
+                    </a:p>
+                  </a:txBody>
+                  <a:tcPr/>
+                </a:tc>
+                <a:tc>
+                  <a:txBody>
+                    <a:bodyPr/>
+                    <a:lstStyle/>
+                    <a:p>
+                      <a:r>
+                        <a:rPr lang="de-DE" sz="1000">
                           <a:solidFill>
                             <a:schemeClr val="tx1"/>
                           </a:solidFill>
                         </a:rPr>
-                        <a:t>requestBody missing</a:t>
-                      </a:r>
-                    </a:p>
-                  </a:txBody>
-                  <a:tcPr/>
-                </a:tc>
-                <a:tc>
-                  <a:txBody>
-                    <a:bodyPr/>
-                    <a:lstStyle/>
-                    <a:p>
-                      <a:r>
-                        <a:rPr lang="de-DE" sz="1200">
-                          <a:solidFill>
-                            <a:schemeClr val="tx1"/>
-                          </a:solidFill>
-                        </a:rPr>
-                        <a:t>requestBody required, but missing</a:t>
-                      </a:r>
-                    </a:p>
-                  </a:txBody>
-                  <a:tcPr/>
-                </a:tc>
-                <a:tc>
-                  <a:txBody>
-                    <a:bodyPr/>
-                    <a:lstStyle/>
-                    <a:p>
-                      <a:r>
-                        <a:rPr lang="de-DE" sz="1200">
-                          <a:solidFill>
-                            <a:srgbClr val="C00000"/>
-                          </a:solidFill>
-                        </a:rPr>
-                        <a:t>400</a:t>
-                      </a:r>
-                    </a:p>
-                  </a:txBody>
-                  <a:tcPr/>
-                </a:tc>
-                <a:tc>
-                  <a:txBody>
-                    <a:bodyPr/>
-                    <a:lstStyle/>
-                    <a:p>
-                      <a:r>
-                        <a:rPr lang="de-DE" sz="1200">
-                          <a:solidFill>
-                            <a:schemeClr val="tx1"/>
-                          </a:solidFill>
-                        </a:rPr>
-                        <a:t>Bad request</a:t>
-                      </a:r>
-                    </a:p>
-                    <a:p>
-                      <a:r>
-                        <a:rPr lang="de-DE" sz="1200">
-                          <a:solidFill>
-                            <a:schemeClr val="tx1"/>
-                          </a:solidFill>
-                        </a:rPr>
-                        <a:t>„missing requestBody“</a:t>
-                      </a:r>
-                    </a:p>
-                  </a:txBody>
-                  <a:tcPr/>
-                </a:tc>
-                <a:tc>
-                  <a:txBody>
-                    <a:bodyPr/>
-                    <a:lstStyle/>
-                    <a:p>
-                      <a:r>
-                        <a:rPr lang="de-DE" sz="1200">
-                          <a:solidFill>
-                            <a:schemeClr val="tx1"/>
-                          </a:solidFill>
-                        </a:rPr>
-                        <a:t>MATR returns a 415, unsupported media type, in NEP this should be 400 to indicate a client error</a:t>
+                        <a:t>Client (NEP)</a:t>
                       </a:r>
                     </a:p>
                   </a:txBody>
@@ -6088,11 +6203,163 @@
                     <a:lstStyle/>
                     <a:p>
                       <a:r>
-                        <a:rPr lang="de-DE" sz="1200">
+                        <a:rPr lang="de-DE" sz="1000">
                           <a:solidFill>
                             <a:schemeClr val="tx1"/>
                           </a:solidFill>
                         </a:rPr>
+                        <a:t>Invalid requestBody</a:t>
+                      </a:r>
+                    </a:p>
+                  </a:txBody>
+                  <a:tcPr/>
+                </a:tc>
+                <a:tc>
+                  <a:txBody>
+                    <a:bodyPr/>
+                    <a:lstStyle/>
+                    <a:p>
+                      <a:pPr marL="171450" indent="-171450">
+                        <a:buFont typeface="Arial" panose="020B0604020202020204" pitchFamily="34" charset="0"/>
+                        <a:buChar char="•"/>
+                      </a:pPr>
+                      <a:r>
+                        <a:rPr lang="de-DE" sz="1000">
+                          <a:solidFill>
+                            <a:schemeClr val="tx1"/>
+                          </a:solidFill>
+                        </a:rPr>
+                        <a:t>requestorProtocol not „HTTP“ or „HTTPS“</a:t>
+                      </a:r>
+                    </a:p>
+                    <a:p>
+                      <a:pPr marL="171450" indent="-171450">
+                        <a:buFont typeface="Arial" panose="020B0604020202020204" pitchFamily="34" charset="0"/>
+                        <a:buChar char="•"/>
+                      </a:pPr>
+                      <a:r>
+                        <a:rPr lang="de-DE" sz="1000">
+                          <a:solidFill>
+                            <a:schemeClr val="tx1"/>
+                          </a:solidFill>
+                        </a:rPr>
+                        <a:t>Invalid IP address format</a:t>
+                      </a:r>
+                    </a:p>
+                    <a:p>
+                      <a:pPr marL="171450" indent="-171450">
+                        <a:buFont typeface="Arial" panose="020B0604020202020204" pitchFamily="34" charset="0"/>
+                        <a:buChar char="•"/>
+                      </a:pPr>
+                      <a:r>
+                        <a:rPr lang="de-DE" sz="1000">
+                          <a:solidFill>
+                            <a:schemeClr val="tx1"/>
+                          </a:solidFill>
+                        </a:rPr>
+                        <a:t>wrong attribute value types</a:t>
+                      </a:r>
+                    </a:p>
+                    <a:p>
+                      <a:pPr marL="171450" indent="-171450">
+                        <a:buFont typeface="Arial" panose="020B0604020202020204" pitchFamily="34" charset="0"/>
+                        <a:buChar char="•"/>
+                      </a:pPr>
+                      <a:r>
+                        <a:rPr lang="de-DE" sz="1000">
+                          <a:solidFill>
+                            <a:schemeClr val="tx1"/>
+                          </a:solidFill>
+                        </a:rPr>
+                        <a:t>Incomplete: required attribute missing</a:t>
+                      </a:r>
+                    </a:p>
+                  </a:txBody>
+                  <a:tcPr/>
+                </a:tc>
+                <a:tc>
+                  <a:txBody>
+                    <a:bodyPr/>
+                    <a:lstStyle/>
+                    <a:p>
+                      <a:r>
+                        <a:rPr lang="de-DE" sz="1000">
+                          <a:solidFill>
+                            <a:srgbClr val="C00000"/>
+                          </a:solidFill>
+                        </a:rPr>
+                        <a:t>400</a:t>
+                      </a:r>
+                    </a:p>
+                  </a:txBody>
+                  <a:tcPr/>
+                </a:tc>
+                <a:tc>
+                  <a:txBody>
+                    <a:bodyPr/>
+                    <a:lstStyle/>
+                    <a:p>
+                      <a:r>
+                        <a:rPr lang="de-DE" sz="1000">
+                          <a:solidFill>
+                            <a:schemeClr val="tx1"/>
+                          </a:solidFill>
+                        </a:rPr>
+                        <a:t>Bad request</a:t>
+                      </a:r>
+                    </a:p>
+                  </a:txBody>
+                  <a:tcPr/>
+                </a:tc>
+                <a:tc>
+                  <a:txBody>
+                    <a:bodyPr/>
+                    <a:lstStyle/>
+                    <a:p>
+                      <a:endParaRPr lang="de-DE" sz="1000">
+                        <a:solidFill>
+                          <a:schemeClr val="tx1"/>
+                        </a:solidFill>
+                      </a:endParaRPr>
+                    </a:p>
+                  </a:txBody>
+                  <a:tcPr/>
+                </a:tc>
+                <a:tc>
+                  <a:txBody>
+                    <a:bodyPr/>
+                    <a:lstStyle/>
+                    <a:p>
+                      <a:r>
+                        <a:rPr lang="de-DE" sz="1000">
+                          <a:solidFill>
+                            <a:schemeClr val="tx1"/>
+                          </a:solidFill>
+                        </a:rPr>
+                        <a:t>Client (NEP)</a:t>
+                      </a:r>
+                    </a:p>
+                  </a:txBody>
+                  <a:tcPr/>
+                </a:tc>
+                <a:extLst>
+                  <a:ext uri="{0D108BD9-81ED-4DB2-BD59-A6C34878D82A}">
+                    <a16:rowId xmlns:a16="http://schemas.microsoft.com/office/drawing/2014/main" val="3623724939"/>
+                  </a:ext>
+                </a:extLst>
+              </a:tr>
+              <a:tr h="370840">
+                <a:tc>
+                  <a:txBody>
+                    <a:bodyPr/>
+                    <a:lstStyle/>
+                    <a:p>
+                      <a:r>
+                        <a:rPr lang="de-DE" sz="1000">
+                          <a:solidFill>
+                            <a:schemeClr val="tx1"/>
+                          </a:solidFill>
+                        </a:rPr>
                         <a:t>requestBody with unknown/invalid mountName</a:t>
                       </a:r>
                     </a:p>
@@ -6105,7 +6372,7 @@
                     <a:lstStyle/>
                     <a:p>
                       <a:r>
-                        <a:rPr lang="de-DE" sz="1200">
+                        <a:rPr lang="de-DE" sz="1000">
                           <a:solidFill>
                             <a:schemeClr val="tx1"/>
                           </a:solidFill>
@@ -6122,7 +6389,7 @@
                     <a:lstStyle/>
                     <a:p>
                       <a:r>
-                        <a:rPr lang="de-DE" sz="1200">
+                        <a:rPr lang="de-DE" sz="1000">
                           <a:solidFill>
                             <a:srgbClr val="C00000"/>
                           </a:solidFill>
@@ -6139,7 +6406,7 @@
                     <a:lstStyle/>
                     <a:p>
                       <a:r>
-                        <a:rPr lang="de-DE" sz="1200">
+                        <a:rPr lang="de-DE" sz="1000">
                           <a:solidFill>
                             <a:schemeClr val="tx1"/>
                           </a:solidFill>
@@ -6147,14 +6414,14 @@
                         <a:t>Not found</a:t>
                       </a:r>
                       <a:br>
-                        <a:rPr lang="de-DE" sz="1200">
+                        <a:rPr lang="de-DE" sz="1000">
                           <a:solidFill>
                             <a:schemeClr val="tx1"/>
                           </a:solidFill>
                         </a:rPr>
                       </a:br>
                       <a:r>
-                        <a:rPr lang="de-DE" sz="1200">
+                        <a:rPr lang="de-DE" sz="1000">
                           <a:solidFill>
                             <a:schemeClr val="tx1"/>
                           </a:solidFill>
@@ -6171,12 +6438,39 @@
                     <a:lstStyle/>
                     <a:p>
                       <a:r>
-                        <a:rPr lang="de-DE" sz="1200">
+                        <a:rPr lang="de-DE" sz="1000">
                           <a:solidFill>
                             <a:schemeClr val="tx1"/>
                           </a:solidFill>
                         </a:rPr>
                         <a:t>MATR currently returns a 500, there‘s an open issue to change it to 404</a:t>
+                      </a:r>
+                    </a:p>
+                    <a:p>
+                      <a:r>
+                        <a:rPr lang="de-DE" sz="1000">
+                          <a:solidFill>
+                            <a:schemeClr val="tx1"/>
+                          </a:solidFill>
+                        </a:rPr>
+                        <a:t>Server (MATR) error</a:t>
+                      </a:r>
+                    </a:p>
+                  </a:txBody>
+                  <a:tcPr/>
+                </a:tc>
+                <a:tc>
+                  <a:txBody>
+                    <a:bodyPr/>
+                    <a:lstStyle/>
+                    <a:p>
+                      <a:r>
+                        <a:rPr lang="de-DE" sz="1000">
+                          <a:solidFill>
+                            <a:schemeClr val="tx1"/>
+                          </a:solidFill>
+                        </a:rPr>
+                        <a:t>Server (MATR)</a:t>
                       </a:r>
                     </a:p>
                   </a:txBody>
@@ -6195,7 +6489,7 @@
                     <a:lstStyle/>
                     <a:p>
                       <a:r>
-                        <a:rPr lang="de-DE" sz="1200">
+                        <a:rPr lang="de-DE" sz="1000">
                           <a:solidFill>
                             <a:schemeClr val="tx1"/>
                           </a:solidFill>
@@ -6203,7 +6497,7 @@
                         <a:t>Valid request, but </a:t>
                       </a:r>
                       <a:r>
-                        <a:rPr lang="de-DE" sz="1200">
+                        <a:rPr lang="de-DE" sz="1000">
                           <a:solidFill>
                             <a:srgbClr val="C00000"/>
                           </a:solidFill>
@@ -6220,7 +6514,7 @@
                     <a:lstStyle/>
                     <a:p>
                       <a:r>
-                        <a:rPr lang="de-DE" sz="1200">
+                        <a:rPr lang="de-DE" sz="1000">
                           <a:solidFill>
                             <a:schemeClr val="tx1"/>
                           </a:solidFill>
@@ -6237,7 +6531,7 @@
                     <a:lstStyle/>
                     <a:p>
                       <a:r>
-                        <a:rPr lang="de-DE" sz="1200">
+                        <a:rPr lang="de-DE" sz="1000">
                           <a:solidFill>
                             <a:srgbClr val="C00000"/>
                           </a:solidFill>
@@ -6254,7 +6548,7 @@
                     <a:lstStyle/>
                     <a:p>
                       <a:r>
-                        <a:rPr lang="de-DE" sz="1200">
+                        <a:rPr lang="de-DE" sz="1000">
                           <a:solidFill>
                             <a:schemeClr val="tx1"/>
                           </a:solidFill>
@@ -6271,12 +6565,29 @@
                     <a:lstStyle/>
                     <a:p>
                       <a:r>
-                        <a:rPr lang="de-DE" sz="1200">
+                        <a:rPr lang="de-DE" sz="1000">
                           <a:solidFill>
                             <a:schemeClr val="tx1"/>
                           </a:solidFill>
                         </a:rPr>
                         <a:t>Some internal NEP error</a:t>
+                      </a:r>
+                    </a:p>
+                  </a:txBody>
+                  <a:tcPr/>
+                </a:tc>
+                <a:tc>
+                  <a:txBody>
+                    <a:bodyPr/>
+                    <a:lstStyle/>
+                    <a:p>
+                      <a:r>
+                        <a:rPr lang="de-DE" sz="1000">
+                          <a:solidFill>
+                            <a:schemeClr val="tx1"/>
+                          </a:solidFill>
+                        </a:rPr>
+                        <a:t>Client (NEP)</a:t>
                       </a:r>
                     </a:p>
                   </a:txBody>
@@ -6295,7 +6606,7 @@
                     <a:lstStyle/>
                     <a:p>
                       <a:r>
-                        <a:rPr lang="de-DE" sz="1200">
+                        <a:rPr lang="de-DE" sz="1000">
                           <a:solidFill>
                             <a:schemeClr val="tx1"/>
                           </a:solidFill>
@@ -6303,7 +6614,7 @@
                         <a:t>Valid request, but </a:t>
                       </a:r>
                       <a:r>
-                        <a:rPr lang="de-DE" sz="1200">
+                        <a:rPr lang="de-DE" sz="1000">
                           <a:solidFill>
                             <a:srgbClr val="C00000"/>
                           </a:solidFill>
@@ -6320,7 +6631,7 @@
                     <a:lstStyle/>
                     <a:p>
                       <a:r>
-                        <a:rPr lang="de-DE" sz="1200">
+                        <a:rPr lang="de-DE" sz="1000">
                           <a:solidFill>
                             <a:schemeClr val="tx1"/>
                           </a:solidFill>
@@ -6337,7 +6648,7 @@
                     <a:lstStyle/>
                     <a:p>
                       <a:r>
-                        <a:rPr lang="de-DE" sz="1200">
+                        <a:rPr lang="de-DE" sz="1000">
                           <a:solidFill>
                             <a:srgbClr val="C00000"/>
                           </a:solidFill>
@@ -6354,7 +6665,7 @@
                     <a:lstStyle/>
                     <a:p>
                       <a:r>
-                        <a:rPr lang="de-DE" sz="1200">
+                        <a:rPr lang="de-DE" sz="1000">
                           <a:solidFill>
                             <a:schemeClr val="tx1"/>
                           </a:solidFill>
@@ -6371,12 +6682,29 @@
                     <a:lstStyle/>
                     <a:p>
                       <a:r>
-                        <a:rPr lang="de-DE" sz="1200">
+                        <a:rPr lang="de-DE" sz="1000">
                           <a:solidFill>
                             <a:schemeClr val="tx1"/>
                           </a:solidFill>
                         </a:rPr>
                         <a:t>e.g. MATR unavailable</a:t>
+                      </a:r>
+                    </a:p>
+                  </a:txBody>
+                  <a:tcPr/>
+                </a:tc>
+                <a:tc>
+                  <a:txBody>
+                    <a:bodyPr/>
+                    <a:lstStyle/>
+                    <a:p>
+                      <a:r>
+                        <a:rPr lang="de-DE" sz="1000">
+                          <a:solidFill>
+                            <a:schemeClr val="tx1"/>
+                          </a:solidFill>
+                        </a:rPr>
+                        <a:t>Server (MATR)</a:t>
                       </a:r>
                     </a:p>
                   </a:txBody>
@@ -6467,10 +6795,76 @@
           </a:p>
         </p:txBody>
       </p:sp>
+      <p:sp>
+        <p:nvSpPr>
+          <p:cNvPr id="3" name="Rechteck 2">
+            <a:extLst>
+              <a:ext uri="{FF2B5EF4-FFF2-40B4-BE49-F238E27FC236}">
+                <a16:creationId xmlns:a16="http://schemas.microsoft.com/office/drawing/2014/main" id="{6273F55F-806B-9315-C8F4-70C1096C5347}"/>
+              </a:ext>
+            </a:extLst>
+          </p:cNvPr>
+          <p:cNvSpPr/>
+          <p:nvPr/>
+        </p:nvSpPr>
+        <p:spPr>
+          <a:xfrm>
+            <a:off x="7970655" y="968990"/>
+            <a:ext cx="3395066" cy="724893"/>
+          </a:xfrm>
+          <a:prstGeom prst="rect">
+            <a:avLst/>
+          </a:prstGeom>
+        </p:spPr>
+        <p:style>
+          <a:lnRef idx="1">
+            <a:schemeClr val="accent3"/>
+          </a:lnRef>
+          <a:fillRef idx="2">
+            <a:schemeClr val="accent3"/>
+          </a:fillRef>
+          <a:effectRef idx="1">
+            <a:schemeClr val="accent3"/>
+          </a:effectRef>
+          <a:fontRef idx="minor">
+            <a:schemeClr val="dk1"/>
+          </a:fontRef>
+        </p:style>
+        <p:txBody>
+          <a:bodyPr rtlCol="0" anchor="ctr"/>
+          <a:lstStyle/>
+          <a:p>
+            <a:r>
+              <a:rPr lang="de-DE" sz="1000" i="1"/>
+              <a:t>Note on requestor-address:</a:t>
+            </a:r>
+          </a:p>
+          <a:p>
+            <a:pPr marL="171450" indent="-171450">
+              <a:buFont typeface="Arial" panose="020B0604020202020204" pitchFamily="34" charset="0"/>
+              <a:buChar char="•"/>
+            </a:pPr>
+            <a:r>
+              <a:rPr lang="de-DE" sz="1000" i="1"/>
+              <a:t>MATR either accepts a domain-name or an IP address </a:t>
+            </a:r>
+          </a:p>
+          <a:p>
+            <a:pPr marL="171450" indent="-171450">
+              <a:buFont typeface="Arial" panose="020B0604020202020204" pitchFamily="34" charset="0"/>
+              <a:buChar char="•"/>
+            </a:pPr>
+            <a:r>
+              <a:rPr lang="de-DE" sz="1000" i="1"/>
+              <a:t>In NEP only IP address is to be used (i.e. Netexplorer must always call the service with the IP address)</a:t>
+            </a:r>
+          </a:p>
+        </p:txBody>
+      </p:sp>
     </p:spTree>
     <p:extLst>
       <p:ext uri="{BB962C8B-B14F-4D97-AF65-F5344CB8AC3E}">
-        <p14:creationId xmlns:p14="http://schemas.microsoft.com/office/powerpoint/2010/main" val="2054235506"/>
+        <p14:creationId xmlns:p14="http://schemas.microsoft.com/office/powerpoint/2010/main" val="2019449332"/>
       </p:ext>
     </p:extLst>
   </p:cSld>
@@ -6641,14 +7035,14 @@
           <p:nvPr>
             <p:extLst>
               <p:ext uri="{D42A27DB-BD31-4B8C-83A1-F6EECF244321}">
-                <p14:modId xmlns:p14="http://schemas.microsoft.com/office/powerpoint/2010/main" val="368601310"/>
+                <p14:modId xmlns:p14="http://schemas.microsoft.com/office/powerpoint/2010/main" val="3052514573"/>
               </p:ext>
             </p:extLst>
           </p:nvPr>
         </p:nvGraphicFramePr>
         <p:xfrm>
-          <a:off x="838200" y="1825625"/>
-          <a:ext cx="10889740" cy="3515360"/>
+          <a:off x="456829" y="1905138"/>
+          <a:ext cx="10889742" cy="4150360"/>
         </p:xfrm>
         <a:graphic>
           <a:graphicData uri="http://schemas.openxmlformats.org/drawingml/2006/table">
@@ -6657,41 +7051,48 @@
                 <a:tableStyleId>{5C22544A-7EE6-4342-B048-85BDC9FD1C3A}</a:tableStyleId>
               </a:tblPr>
               <a:tblGrid>
-                <a:gridCol w="2177948">
+                <a:gridCol w="1814957">
                   <a:extLst>
                     <a:ext uri="{9D8B030D-6E8A-4147-A177-3AD203B41FA5}">
                       <a16:colId xmlns:a16="http://schemas.microsoft.com/office/drawing/2014/main" val="3889186880"/>
                     </a:ext>
                   </a:extLst>
                 </a:gridCol>
-                <a:gridCol w="2177948">
+                <a:gridCol w="1814957">
                   <a:extLst>
                     <a:ext uri="{9D8B030D-6E8A-4147-A177-3AD203B41FA5}">
                       <a16:colId xmlns:a16="http://schemas.microsoft.com/office/drawing/2014/main" val="3012673204"/>
                     </a:ext>
                   </a:extLst>
                 </a:gridCol>
-                <a:gridCol w="2177948">
+                <a:gridCol w="1814957">
                   <a:extLst>
                     <a:ext uri="{9D8B030D-6E8A-4147-A177-3AD203B41FA5}">
                       <a16:colId xmlns:a16="http://schemas.microsoft.com/office/drawing/2014/main" val="304318035"/>
                     </a:ext>
                   </a:extLst>
                 </a:gridCol>
-                <a:gridCol w="2177948">
+                <a:gridCol w="1814957">
                   <a:extLst>
                     <a:ext uri="{9D8B030D-6E8A-4147-A177-3AD203B41FA5}">
                       <a16:colId xmlns:a16="http://schemas.microsoft.com/office/drawing/2014/main" val="603620899"/>
                     </a:ext>
                   </a:extLst>
                 </a:gridCol>
-                <a:gridCol w="2177948">
+                <a:gridCol w="1814957">
                   <a:extLst>
                     <a:ext uri="{9D8B030D-6E8A-4147-A177-3AD203B41FA5}">
                       <a16:colId xmlns:a16="http://schemas.microsoft.com/office/drawing/2014/main" val="241882064"/>
                     </a:ext>
                   </a:extLst>
                 </a:gridCol>
+                <a:gridCol w="1814957">
+                  <a:extLst>
+                    <a:ext uri="{9D8B030D-6E8A-4147-A177-3AD203B41FA5}">
+                      <a16:colId xmlns:a16="http://schemas.microsoft.com/office/drawing/2014/main" val="464889822"/>
+                    </a:ext>
+                  </a:extLst>
+                </a:gridCol>
               </a:tblGrid>
               <a:tr h="0">
                 <a:tc>
@@ -6754,6 +7155,19 @@
                       <a:r>
                         <a:rPr lang="de-DE" sz="1400"/>
                         <a:t>Info</a:t>
+                      </a:r>
+                    </a:p>
+                  </a:txBody>
+                  <a:tcPr/>
+                </a:tc>
+                <a:tc>
+                  <a:txBody>
+                    <a:bodyPr/>
+                    <a:lstStyle/>
+                    <a:p>
+                      <a:r>
+                        <a:rPr lang="de-DE" sz="1400"/>
+                        <a:t>Client / Server error</a:t>
                       </a:r>
                     </a:p>
                   </a:txBody>
@@ -6847,6 +7261,20 @@
                   </a:txBody>
                   <a:tcPr/>
                 </a:tc>
+                <a:tc>
+                  <a:txBody>
+                    <a:bodyPr/>
+                    <a:lstStyle/>
+                    <a:p>
+                      <a:endParaRPr lang="de-DE" sz="1200" i="1">
+                        <a:solidFill>
+                          <a:schemeClr val="tx1"/>
+                        </a:solidFill>
+                      </a:endParaRPr>
+                    </a:p>
+                  </a:txBody>
+                  <a:tcPr/>
+                </a:tc>
                 <a:extLst>
                   <a:ext uri="{0D108BD9-81ED-4DB2-BD59-A6C34878D82A}">
                     <a16:rowId xmlns:a16="http://schemas.microsoft.com/office/drawing/2014/main" val="1558608163"/>
@@ -6940,6 +7368,20 @@
                   </a:txBody>
                   <a:tcPr/>
                 </a:tc>
+                <a:tc>
+                  <a:txBody>
+                    <a:bodyPr/>
+                    <a:lstStyle/>
+                    <a:p>
+                      <a:endParaRPr lang="de-DE" sz="1200" i="1">
+                        <a:solidFill>
+                          <a:schemeClr val="tx1"/>
+                        </a:solidFill>
+                      </a:endParaRPr>
+                    </a:p>
+                  </a:txBody>
+                  <a:tcPr/>
+                </a:tc>
                 <a:extLst>
                   <a:ext uri="{0D108BD9-81ED-4DB2-BD59-A6C34878D82A}">
                     <a16:rowId xmlns:a16="http://schemas.microsoft.com/office/drawing/2014/main" val="483862774"/>
@@ -7037,6 +7479,23 @@
                           </a:solidFill>
                         </a:rPr>
                         <a:t>(*)</a:t>
+                      </a:r>
+                    </a:p>
+                  </a:txBody>
+                  <a:tcPr/>
+                </a:tc>
+                <a:tc>
+                  <a:txBody>
+                    <a:bodyPr/>
+                    <a:lstStyle/>
+                    <a:p>
+                      <a:r>
+                        <a:rPr lang="de-DE" sz="1200">
+                          <a:solidFill>
+                            <a:schemeClr val="tx1"/>
+                          </a:solidFill>
+                        </a:rPr>
+                        <a:t>Client (NEP)</a:t>
                       </a:r>
                     </a:p>
                   </a:txBody>
@@ -7161,6 +7620,40 @@
                   </a:txBody>
                   <a:tcPr/>
                 </a:tc>
+                <a:tc>
+                  <a:txBody>
+                    <a:bodyPr/>
+                    <a:lstStyle/>
+                    <a:p>
+                      <a:pPr marL="0" marR="0" lvl="0" indent="0" algn="l" defTabSz="914400" rtl="0" eaLnBrk="1" fontAlgn="auto" latinLnBrk="0" hangingPunct="1">
+                        <a:lnSpc>
+                          <a:spcPct val="100000"/>
+                        </a:lnSpc>
+                        <a:spcBef>
+                          <a:spcPts val="0"/>
+                        </a:spcBef>
+                        <a:spcAft>
+                          <a:spcPts val="0"/>
+                        </a:spcAft>
+                        <a:buClrTx/>
+                        <a:buSzTx/>
+                        <a:buFontTx/>
+                        <a:buNone/>
+                        <a:tabLst/>
+                        <a:defRPr/>
+                      </a:pPr>
+                      <a:r>
+                        <a:rPr lang="de-DE" sz="1200">
+                          <a:solidFill>
+                            <a:schemeClr val="tx1"/>
+                          </a:solidFill>
+                        </a:rPr>
+                        <a:t>Client (NEP)</a:t>
+                      </a:r>
+                    </a:p>
+                  </a:txBody>
+                  <a:tcPr/>
+                </a:tc>
                 <a:extLst>
                   <a:ext uri="{0D108BD9-81ED-4DB2-BD59-A6C34878D82A}">
                     <a16:rowId xmlns:a16="http://schemas.microsoft.com/office/drawing/2014/main" val="1711514898"/>
@@ -7263,6 +7756,23 @@
                   </a:txBody>
                   <a:tcPr/>
                 </a:tc>
+                <a:tc>
+                  <a:txBody>
+                    <a:bodyPr/>
+                    <a:lstStyle/>
+                    <a:p>
+                      <a:r>
+                        <a:rPr lang="de-DE" sz="1200">
+                          <a:solidFill>
+                            <a:schemeClr val="tx1"/>
+                          </a:solidFill>
+                        </a:rPr>
+                        <a:t>Server (MATR)</a:t>
+                      </a:r>
+                    </a:p>
+                  </a:txBody>
+                  <a:tcPr/>
+                </a:tc>
                 <a:extLst>
                   <a:ext uri="{0D108BD9-81ED-4DB2-BD59-A6C34878D82A}">
                     <a16:rowId xmlns:a16="http://schemas.microsoft.com/office/drawing/2014/main" val="1851629258"/>
@@ -7363,6 +7873,23 @@
                   </a:txBody>
                   <a:tcPr/>
                 </a:tc>
+                <a:tc>
+                  <a:txBody>
+                    <a:bodyPr/>
+                    <a:lstStyle/>
+                    <a:p>
+                      <a:r>
+                        <a:rPr lang="de-DE" sz="1200">
+                          <a:solidFill>
+                            <a:schemeClr val="tx1"/>
+                          </a:solidFill>
+                        </a:rPr>
+                        <a:t>Client (NEP)</a:t>
+                      </a:r>
+                    </a:p>
+                  </a:txBody>
+                  <a:tcPr/>
+                </a:tc>
                 <a:extLst>
                   <a:ext uri="{0D108BD9-81ED-4DB2-BD59-A6C34878D82A}">
                     <a16:rowId xmlns:a16="http://schemas.microsoft.com/office/drawing/2014/main" val="3776332936"/>
@@ -7458,6 +7985,23 @@
                           </a:solidFill>
                         </a:rPr>
                         <a:t>e.g. MATR unavailable</a:t>
+                      </a:r>
+                    </a:p>
+                  </a:txBody>
+                  <a:tcPr/>
+                </a:tc>
+                <a:tc>
+                  <a:txBody>
+                    <a:bodyPr/>
+                    <a:lstStyle/>
+                    <a:p>
+                      <a:r>
+                        <a:rPr lang="de-DE" sz="1200">
+                          <a:solidFill>
+                            <a:schemeClr val="tx1"/>
+                          </a:solidFill>
+                        </a:rPr>
+                        <a:t>Server (MATR)</a:t>
                       </a:r>
                     </a:p>
                   </a:txBody>

</xml_diff>

<commit_message>
Update error code description (#55)
* update file

* update
</commit_message>
<xml_diff>
--- a/spec/additionalDescription/sources/NEP ErrorCodes.pptx
+++ b/spec/additionalDescription/sources/NEP ErrorCodes.pptx
@@ -263,7 +263,7 @@
           <a:p>
             <a:fld id="{2122B19E-09EC-44A4-9188-1701461FF1B9}" type="datetimeFigureOut">
               <a:rPr lang="de-DE" smtClean="0"/>
-              <a:t>24.07.2024</a:t>
+              <a:t>02.08.2024</a:t>
             </a:fld>
             <a:endParaRPr lang="de-DE"/>
           </a:p>
@@ -461,7 +461,7 @@
           <a:p>
             <a:fld id="{2122B19E-09EC-44A4-9188-1701461FF1B9}" type="datetimeFigureOut">
               <a:rPr lang="de-DE" smtClean="0"/>
-              <a:t>24.07.2024</a:t>
+              <a:t>02.08.2024</a:t>
             </a:fld>
             <a:endParaRPr lang="de-DE"/>
           </a:p>
@@ -669,7 +669,7 @@
           <a:p>
             <a:fld id="{2122B19E-09EC-44A4-9188-1701461FF1B9}" type="datetimeFigureOut">
               <a:rPr lang="de-DE" smtClean="0"/>
-              <a:t>24.07.2024</a:t>
+              <a:t>02.08.2024</a:t>
             </a:fld>
             <a:endParaRPr lang="de-DE"/>
           </a:p>
@@ -867,7 +867,7 @@
           <a:p>
             <a:fld id="{2122B19E-09EC-44A4-9188-1701461FF1B9}" type="datetimeFigureOut">
               <a:rPr lang="de-DE" smtClean="0"/>
-              <a:t>24.07.2024</a:t>
+              <a:t>02.08.2024</a:t>
             </a:fld>
             <a:endParaRPr lang="de-DE"/>
           </a:p>
@@ -1142,7 +1142,7 @@
           <a:p>
             <a:fld id="{2122B19E-09EC-44A4-9188-1701461FF1B9}" type="datetimeFigureOut">
               <a:rPr lang="de-DE" smtClean="0"/>
-              <a:t>24.07.2024</a:t>
+              <a:t>02.08.2024</a:t>
             </a:fld>
             <a:endParaRPr lang="de-DE"/>
           </a:p>
@@ -1407,7 +1407,7 @@
           <a:p>
             <a:fld id="{2122B19E-09EC-44A4-9188-1701461FF1B9}" type="datetimeFigureOut">
               <a:rPr lang="de-DE" smtClean="0"/>
-              <a:t>24.07.2024</a:t>
+              <a:t>02.08.2024</a:t>
             </a:fld>
             <a:endParaRPr lang="de-DE"/>
           </a:p>
@@ -1819,7 +1819,7 @@
           <a:p>
             <a:fld id="{2122B19E-09EC-44A4-9188-1701461FF1B9}" type="datetimeFigureOut">
               <a:rPr lang="de-DE" smtClean="0"/>
-              <a:t>24.07.2024</a:t>
+              <a:t>02.08.2024</a:t>
             </a:fld>
             <a:endParaRPr lang="de-DE"/>
           </a:p>
@@ -1960,7 +1960,7 @@
           <a:p>
             <a:fld id="{2122B19E-09EC-44A4-9188-1701461FF1B9}" type="datetimeFigureOut">
               <a:rPr lang="de-DE" smtClean="0"/>
-              <a:t>24.07.2024</a:t>
+              <a:t>02.08.2024</a:t>
             </a:fld>
             <a:endParaRPr lang="de-DE"/>
           </a:p>
@@ -2073,7 +2073,7 @@
           <a:p>
             <a:fld id="{2122B19E-09EC-44A4-9188-1701461FF1B9}" type="datetimeFigureOut">
               <a:rPr lang="de-DE" smtClean="0"/>
-              <a:t>24.07.2024</a:t>
+              <a:t>02.08.2024</a:t>
             </a:fld>
             <a:endParaRPr lang="de-DE"/>
           </a:p>
@@ -2384,7 +2384,7 @@
           <a:p>
             <a:fld id="{2122B19E-09EC-44A4-9188-1701461FF1B9}" type="datetimeFigureOut">
               <a:rPr lang="de-DE" smtClean="0"/>
-              <a:t>24.07.2024</a:t>
+              <a:t>02.08.2024</a:t>
             </a:fld>
             <a:endParaRPr lang="de-DE"/>
           </a:p>
@@ -2672,7 +2672,7 @@
           <a:p>
             <a:fld id="{2122B19E-09EC-44A4-9188-1701461FF1B9}" type="datetimeFigureOut">
               <a:rPr lang="de-DE" smtClean="0"/>
-              <a:t>24.07.2024</a:t>
+              <a:t>02.08.2024</a:t>
             </a:fld>
             <a:endParaRPr lang="de-DE"/>
           </a:p>
@@ -2913,7 +2913,7 @@
           <a:p>
             <a:fld id="{2122B19E-09EC-44A4-9188-1701461FF1B9}" type="datetimeFigureOut">
               <a:rPr lang="de-DE" smtClean="0"/>
-              <a:t>24.07.2024</a:t>
+              <a:t>02.08.2024</a:t>
             </a:fld>
             <a:endParaRPr lang="de-DE"/>
           </a:p>
@@ -4616,14 +4616,14 @@
           <p:nvPr>
             <p:extLst>
               <p:ext uri="{D42A27DB-BD31-4B8C-83A1-F6EECF244321}">
-                <p14:modId xmlns:p14="http://schemas.microsoft.com/office/powerpoint/2010/main" val="243660731"/>
+                <p14:modId xmlns:p14="http://schemas.microsoft.com/office/powerpoint/2010/main" val="2857908399"/>
               </p:ext>
             </p:extLst>
           </p:nvPr>
         </p:nvGraphicFramePr>
         <p:xfrm>
           <a:off x="570295" y="1650826"/>
-          <a:ext cx="10889741" cy="3469640"/>
+          <a:ext cx="10889741" cy="3637280"/>
         </p:xfrm>
         <a:graphic>
           <a:graphicData uri="http://schemas.openxmlformats.org/drawingml/2006/table">
@@ -5069,7 +5069,7 @@
                     <a:p>
                       <a:r>
                         <a:rPr lang="de-DE" sz="1100"/>
-                        <a:t>MATR returns a 415, unsupported media type, in NEP this should be 400</a:t>
+                        <a:t>MATR returns a 415, unsupported media type, in NEP this should be 400 (see MATR issue #233)</a:t>
                       </a:r>
                     </a:p>
                   </a:txBody>
@@ -5190,14 +5190,17 @@
                         <a:tabLst/>
                         <a:defRPr/>
                       </a:pPr>
-                      <a:endParaRPr lang="en-US" sz="1100" i="1" kern="1200">
-                        <a:solidFill>
-                          <a:schemeClr val="dk1"/>
-                        </a:solidFill>
-                        <a:latin typeface="+mn-lt"/>
-                        <a:ea typeface="+mn-ea"/>
-                        <a:cs typeface="+mn-cs"/>
-                      </a:endParaRPr>
+                      <a:r>
+                        <a:rPr lang="en-US" sz="1100" i="0" kern="1200">
+                          <a:solidFill>
+                            <a:schemeClr val="dk1"/>
+                          </a:solidFill>
+                          <a:latin typeface="+mn-lt"/>
+                          <a:ea typeface="+mn-ea"/>
+                          <a:cs typeface="+mn-cs"/>
+                        </a:rPr>
+                        <a:t>MATR also returns 400</a:t>
+                      </a:r>
                     </a:p>
                   </a:txBody>
                   <a:tcPr/>
@@ -5723,14 +5726,14 @@
           <p:nvPr>
             <p:extLst>
               <p:ext uri="{D42A27DB-BD31-4B8C-83A1-F6EECF244321}">
-                <p14:modId xmlns:p14="http://schemas.microsoft.com/office/powerpoint/2010/main" val="1424448471"/>
+                <p14:modId xmlns:p14="http://schemas.microsoft.com/office/powerpoint/2010/main" val="3443442910"/>
               </p:ext>
             </p:extLst>
           </p:nvPr>
         </p:nvGraphicFramePr>
         <p:xfrm>
           <a:off x="583644" y="1944502"/>
-          <a:ext cx="10889739" cy="4307840"/>
+          <a:ext cx="10889739" cy="4500880"/>
         </p:xfrm>
         <a:graphic>
           <a:graphicData uri="http://schemas.openxmlformats.org/drawingml/2006/table">
@@ -5789,7 +5792,7 @@
                     <a:lstStyle/>
                     <a:p>
                       <a:r>
-                        <a:rPr lang="de-DE" sz="1400"/>
+                        <a:rPr lang="de-DE" sz="1200"/>
                         <a:t>Case</a:t>
                       </a:r>
                     </a:p>
@@ -5802,7 +5805,7 @@
                     <a:lstStyle/>
                     <a:p>
                       <a:r>
-                        <a:rPr lang="de-DE" sz="1400"/>
+                        <a:rPr lang="de-DE" sz="1200"/>
                         <a:t>error cause</a:t>
                       </a:r>
                     </a:p>
@@ -5815,7 +5818,7 @@
                     <a:lstStyle/>
                     <a:p>
                       <a:r>
-                        <a:rPr lang="de-DE" sz="1400"/>
+                        <a:rPr lang="de-DE" sz="1200"/>
                         <a:t>ResponseCode</a:t>
                       </a:r>
                     </a:p>
@@ -5828,7 +5831,7 @@
                     <a:lstStyle/>
                     <a:p>
                       <a:r>
-                        <a:rPr lang="de-DE" sz="1400"/>
+                        <a:rPr lang="de-DE" sz="1200"/>
                         <a:t>Message</a:t>
                       </a:r>
                     </a:p>
@@ -5841,7 +5844,7 @@
                     <a:lstStyle/>
                     <a:p>
                       <a:r>
-                        <a:rPr lang="de-DE" sz="1400"/>
+                        <a:rPr lang="de-DE" sz="1200"/>
                         <a:t>Info</a:t>
                       </a:r>
                     </a:p>
@@ -5854,7 +5857,7 @@
                     <a:lstStyle/>
                     <a:p>
                       <a:r>
-                        <a:rPr lang="de-DE" sz="1400"/>
+                        <a:rPr lang="de-DE" sz="1200"/>
                         <a:t>Client / Server error</a:t>
                       </a:r>
                     </a:p>
@@ -5874,7 +5877,7 @@
                     <a:lstStyle/>
                     <a:p>
                       <a:r>
-                        <a:rPr lang="de-DE" sz="1000">
+                        <a:rPr lang="de-DE" sz="900">
                           <a:solidFill>
                             <a:schemeClr val="tx1"/>
                           </a:solidFill>
@@ -5890,7 +5893,7 @@
                     <a:bodyPr/>
                     <a:lstStyle/>
                     <a:p>
-                      <a:endParaRPr lang="de-DE" sz="1000">
+                      <a:endParaRPr lang="de-DE" sz="900">
                         <a:solidFill>
                           <a:schemeClr val="tx1"/>
                         </a:solidFill>
@@ -5905,7 +5908,7 @@
                     <a:lstStyle/>
                     <a:p>
                       <a:r>
-                        <a:rPr lang="de-DE" sz="1000">
+                        <a:rPr lang="de-DE" sz="900">
                           <a:solidFill>
                             <a:schemeClr val="accent6">
                               <a:lumMod val="50000"/>
@@ -5924,7 +5927,7 @@
                     <a:lstStyle/>
                     <a:p>
                       <a:r>
-                        <a:rPr lang="de-DE" sz="1000">
+                        <a:rPr lang="de-DE" sz="900">
                           <a:solidFill>
                             <a:schemeClr val="tx1"/>
                           </a:solidFill>
@@ -5941,7 +5944,7 @@
                     <a:lstStyle/>
                     <a:p>
                       <a:r>
-                        <a:rPr lang="de-DE" sz="1000">
+                        <a:rPr lang="de-DE" sz="900">
                           <a:solidFill>
                             <a:schemeClr val="tx1"/>
                           </a:solidFill>
@@ -5957,7 +5960,7 @@
                     <a:bodyPr/>
                     <a:lstStyle/>
                     <a:p>
-                      <a:endParaRPr lang="de-DE" sz="1000">
+                      <a:endParaRPr lang="de-DE" sz="900">
                         <a:solidFill>
                           <a:schemeClr val="tx1"/>
                         </a:solidFill>
@@ -5979,7 +5982,7 @@
                     <a:lstStyle/>
                     <a:p>
                       <a:r>
-                        <a:rPr lang="de-DE" sz="1000">
+                        <a:rPr lang="de-DE" sz="900">
                           <a:solidFill>
                             <a:schemeClr val="tx1"/>
                           </a:solidFill>
@@ -5995,7 +5998,7 @@
                     <a:bodyPr/>
                     <a:lstStyle/>
                     <a:p>
-                      <a:endParaRPr lang="de-DE" sz="1000">
+                      <a:endParaRPr lang="de-DE" sz="900">
                         <a:solidFill>
                           <a:schemeClr val="tx1"/>
                         </a:solidFill>
@@ -6010,7 +6013,7 @@
                     <a:lstStyle/>
                     <a:p>
                       <a:r>
-                        <a:rPr lang="de-DE" sz="1000">
+                        <a:rPr lang="de-DE" sz="900">
                           <a:solidFill>
                             <a:schemeClr val="accent6">
                               <a:lumMod val="50000"/>
@@ -6029,7 +6032,7 @@
                     <a:lstStyle/>
                     <a:p>
                       <a:r>
-                        <a:rPr lang="de-DE" sz="1000">
+                        <a:rPr lang="de-DE" sz="900">
                           <a:solidFill>
                             <a:schemeClr val="tx1"/>
                           </a:solidFill>
@@ -6046,7 +6049,7 @@
                     <a:lstStyle/>
                     <a:p>
                       <a:r>
-                        <a:rPr lang="de-DE" sz="1000">
+                        <a:rPr lang="de-DE" sz="900">
                           <a:solidFill>
                             <a:schemeClr val="tx1"/>
                           </a:solidFill>
@@ -6062,7 +6065,7 @@
                     <a:bodyPr/>
                     <a:lstStyle/>
                     <a:p>
-                      <a:endParaRPr lang="de-DE" sz="1000">
+                      <a:endParaRPr lang="de-DE" sz="900">
                         <a:solidFill>
                           <a:schemeClr val="tx1"/>
                         </a:solidFill>
@@ -6084,7 +6087,7 @@
                     <a:lstStyle/>
                     <a:p>
                       <a:r>
-                        <a:rPr lang="de-DE" sz="1000">
+                        <a:rPr lang="de-DE" sz="900">
                           <a:solidFill>
                             <a:schemeClr val="tx1"/>
                           </a:solidFill>
@@ -6101,7 +6104,7 @@
                     <a:lstStyle/>
                     <a:p>
                       <a:r>
-                        <a:rPr lang="de-DE" sz="1000">
+                        <a:rPr lang="de-DE" sz="900">
                           <a:solidFill>
                             <a:schemeClr val="tx1"/>
                           </a:solidFill>
@@ -6118,7 +6121,7 @@
                     <a:lstStyle/>
                     <a:p>
                       <a:r>
-                        <a:rPr lang="de-DE" sz="1000">
+                        <a:rPr lang="de-DE" sz="900">
                           <a:solidFill>
                             <a:srgbClr val="C00000"/>
                           </a:solidFill>
@@ -6135,7 +6138,7 @@
                     <a:lstStyle/>
                     <a:p>
                       <a:r>
-                        <a:rPr lang="de-DE" sz="1000">
+                        <a:rPr lang="de-DE" sz="900">
                           <a:solidFill>
                             <a:schemeClr val="tx1"/>
                           </a:solidFill>
@@ -6145,7 +6148,7 @@
                     </a:p>
                     <a:p>
                       <a:r>
-                        <a:rPr lang="de-DE" sz="1000">
+                        <a:rPr lang="de-DE" sz="900">
                           <a:solidFill>
                             <a:schemeClr val="tx1"/>
                           </a:solidFill>
@@ -6162,7 +6165,7 @@
                     <a:lstStyle/>
                     <a:p>
                       <a:r>
-                        <a:rPr lang="de-DE" sz="1000">
+                        <a:rPr lang="de-DE" sz="900">
                           <a:solidFill>
                             <a:schemeClr val="tx1"/>
                           </a:solidFill>
@@ -6179,7 +6182,7 @@
                     <a:lstStyle/>
                     <a:p>
                       <a:r>
-                        <a:rPr lang="de-DE" sz="1000">
+                        <a:rPr lang="de-DE" sz="900">
                           <a:solidFill>
                             <a:schemeClr val="tx1"/>
                           </a:solidFill>
@@ -6203,7 +6206,7 @@
                     <a:lstStyle/>
                     <a:p>
                       <a:r>
-                        <a:rPr lang="de-DE" sz="1000">
+                        <a:rPr lang="de-DE" sz="900">
                           <a:solidFill>
                             <a:schemeClr val="tx1"/>
                           </a:solidFill>
@@ -6224,7 +6227,7 @@
                         <a:buChar char="•"/>
                       </a:pPr>
                       <a:r>
-                        <a:rPr lang="de-DE" sz="1000">
+                        <a:rPr lang="de-DE" sz="900">
                           <a:solidFill>
                             <a:schemeClr val="tx1"/>
                           </a:solidFill>
@@ -6238,7 +6241,7 @@
                         <a:buChar char="•"/>
                       </a:pPr>
                       <a:r>
-                        <a:rPr lang="de-DE" sz="1000">
+                        <a:rPr lang="de-DE" sz="900">
                           <a:solidFill>
                             <a:schemeClr val="tx1"/>
                           </a:solidFill>
@@ -6252,7 +6255,7 @@
                         <a:buChar char="•"/>
                       </a:pPr>
                       <a:r>
-                        <a:rPr lang="de-DE" sz="1000">
+                        <a:rPr lang="de-DE" sz="900">
                           <a:solidFill>
                             <a:schemeClr val="tx1"/>
                           </a:solidFill>
@@ -6266,7 +6269,7 @@
                         <a:buChar char="•"/>
                       </a:pPr>
                       <a:r>
-                        <a:rPr lang="de-DE" sz="1000">
+                        <a:rPr lang="de-DE" sz="900">
                           <a:solidFill>
                             <a:schemeClr val="tx1"/>
                           </a:solidFill>
@@ -6283,7 +6286,7 @@
                     <a:lstStyle/>
                     <a:p>
                       <a:r>
-                        <a:rPr lang="de-DE" sz="1000">
+                        <a:rPr lang="de-DE" sz="900">
                           <a:solidFill>
                             <a:srgbClr val="C00000"/>
                           </a:solidFill>
@@ -6300,7 +6303,7 @@
                     <a:lstStyle/>
                     <a:p>
                       <a:r>
-                        <a:rPr lang="de-DE" sz="1000">
+                        <a:rPr lang="de-DE" sz="900">
                           <a:solidFill>
                             <a:schemeClr val="tx1"/>
                           </a:solidFill>
@@ -6316,7 +6319,7 @@
                     <a:bodyPr/>
                     <a:lstStyle/>
                     <a:p>
-                      <a:endParaRPr lang="de-DE" sz="1000">
+                      <a:endParaRPr lang="de-DE" sz="900">
                         <a:solidFill>
                           <a:schemeClr val="tx1"/>
                         </a:solidFill>
@@ -6331,7 +6334,7 @@
                     <a:lstStyle/>
                     <a:p>
                       <a:r>
-                        <a:rPr lang="de-DE" sz="1000">
+                        <a:rPr lang="de-DE" sz="900">
                           <a:solidFill>
                             <a:schemeClr val="tx1"/>
                           </a:solidFill>
@@ -6355,7 +6358,7 @@
                     <a:lstStyle/>
                     <a:p>
                       <a:r>
-                        <a:rPr lang="de-DE" sz="1000">
+                        <a:rPr lang="de-DE" sz="900">
                           <a:solidFill>
                             <a:schemeClr val="tx1"/>
                           </a:solidFill>
@@ -6372,7 +6375,7 @@
                     <a:lstStyle/>
                     <a:p>
                       <a:r>
-                        <a:rPr lang="de-DE" sz="1000">
+                        <a:rPr lang="de-DE" sz="900">
                           <a:solidFill>
                             <a:schemeClr val="tx1"/>
                           </a:solidFill>
@@ -6389,7 +6392,7 @@
                     <a:lstStyle/>
                     <a:p>
                       <a:r>
-                        <a:rPr lang="de-DE" sz="1000">
+                        <a:rPr lang="de-DE" sz="900">
                           <a:solidFill>
                             <a:srgbClr val="C00000"/>
                           </a:solidFill>
@@ -6406,7 +6409,7 @@
                     <a:lstStyle/>
                     <a:p>
                       <a:r>
-                        <a:rPr lang="de-DE" sz="1000">
+                        <a:rPr lang="de-DE" sz="900">
                           <a:solidFill>
                             <a:schemeClr val="tx1"/>
                           </a:solidFill>
@@ -6414,14 +6417,14 @@
                         <a:t>Not found</a:t>
                       </a:r>
                       <a:br>
-                        <a:rPr lang="de-DE" sz="1000">
+                        <a:rPr lang="de-DE" sz="900">
                           <a:solidFill>
                             <a:schemeClr val="tx1"/>
                           </a:solidFill>
                         </a:rPr>
                       </a:br>
                       <a:r>
-                        <a:rPr lang="de-DE" sz="1000">
+                        <a:rPr lang="de-DE" sz="900">
                           <a:solidFill>
                             <a:schemeClr val="tx1"/>
                           </a:solidFill>
@@ -6438,7 +6441,7 @@
                     <a:lstStyle/>
                     <a:p>
                       <a:r>
-                        <a:rPr lang="de-DE" sz="1000">
+                        <a:rPr lang="de-DE" sz="900">
                           <a:solidFill>
                             <a:schemeClr val="tx1"/>
                           </a:solidFill>
@@ -6448,7 +6451,7 @@
                     </a:p>
                     <a:p>
                       <a:r>
-                        <a:rPr lang="de-DE" sz="1000">
+                        <a:rPr lang="de-DE" sz="900">
                           <a:solidFill>
                             <a:schemeClr val="tx1"/>
                           </a:solidFill>
@@ -6465,7 +6468,7 @@
                     <a:lstStyle/>
                     <a:p>
                       <a:r>
-                        <a:rPr lang="de-DE" sz="1000">
+                        <a:rPr lang="de-DE" sz="900">
                           <a:solidFill>
                             <a:schemeClr val="tx1"/>
                           </a:solidFill>
@@ -6489,15 +6492,145 @@
                     <a:lstStyle/>
                     <a:p>
                       <a:r>
-                        <a:rPr lang="de-DE" sz="1000">
+                        <a:rPr lang="de-DE" sz="900">
                           <a:solidFill>
                             <a:schemeClr val="tx1"/>
                           </a:solidFill>
                         </a:rPr>
+                        <a:t>Too many parallel requests / too many requests within 1 min</a:t>
+                      </a:r>
+                    </a:p>
+                  </a:txBody>
+                  <a:tcPr/>
+                </a:tc>
+                <a:tc>
+                  <a:txBody>
+                    <a:bodyPr/>
+                    <a:lstStyle/>
+                    <a:p>
+                      <a:endParaRPr lang="de-DE" sz="900">
+                        <a:solidFill>
+                          <a:schemeClr val="tx1"/>
+                        </a:solidFill>
+                      </a:endParaRPr>
+                    </a:p>
+                  </a:txBody>
+                  <a:tcPr/>
+                </a:tc>
+                <a:tc>
+                  <a:txBody>
+                    <a:bodyPr/>
+                    <a:lstStyle/>
+                    <a:p>
+                      <a:r>
+                        <a:rPr lang="de-DE" sz="900">
+                          <a:solidFill>
+                            <a:srgbClr val="C00000"/>
+                          </a:solidFill>
+                        </a:rPr>
+                        <a:t>429</a:t>
+                      </a:r>
+                    </a:p>
+                  </a:txBody>
+                  <a:tcPr/>
+                </a:tc>
+                <a:tc>
+                  <a:txBody>
+                    <a:bodyPr/>
+                    <a:lstStyle/>
+                    <a:p>
+                      <a:r>
+                        <a:rPr lang="de-DE" sz="900">
+                          <a:solidFill>
+                            <a:schemeClr val="tx1"/>
+                          </a:solidFill>
+                        </a:rPr>
+                        <a:t>Too many requests</a:t>
+                      </a:r>
+                    </a:p>
+                  </a:txBody>
+                  <a:tcPr/>
+                </a:tc>
+                <a:tc>
+                  <a:txBody>
+                    <a:bodyPr/>
+                    <a:lstStyle/>
+                    <a:p>
+                      <a:r>
+                        <a:rPr lang="de-DE" sz="900">
+                          <a:solidFill>
+                            <a:schemeClr val="tx1"/>
+                          </a:solidFill>
+                        </a:rPr>
+                        <a:t>In case of incoming requests, # of currently parallel requests and # of already send requests within last minute are compared to integer profiles</a:t>
+                      </a:r>
+                    </a:p>
+                  </a:txBody>
+                  <a:tcPr/>
+                </a:tc>
+                <a:tc>
+                  <a:txBody>
+                    <a:bodyPr/>
+                    <a:lstStyle/>
+                    <a:p>
+                      <a:pPr marL="0" marR="0" lvl="0" indent="0" algn="l" defTabSz="914400" rtl="0" eaLnBrk="1" fontAlgn="auto" latinLnBrk="0" hangingPunct="1">
+                        <a:lnSpc>
+                          <a:spcPct val="100000"/>
+                        </a:lnSpc>
+                        <a:spcBef>
+                          <a:spcPts val="0"/>
+                        </a:spcBef>
+                        <a:spcAft>
+                          <a:spcPts val="0"/>
+                        </a:spcAft>
+                        <a:buClrTx/>
+                        <a:buSzTx/>
+                        <a:buFontTx/>
+                        <a:buNone/>
+                        <a:tabLst/>
+                        <a:defRPr/>
+                      </a:pPr>
+                      <a:r>
+                        <a:rPr lang="de-DE" sz="900">
+                          <a:solidFill>
+                            <a:schemeClr val="tx1"/>
+                          </a:solidFill>
+                        </a:rPr>
+                        <a:t>Client (NEP)</a:t>
+                      </a:r>
+                    </a:p>
+                    <a:p>
+                      <a:endParaRPr lang="de-DE" sz="900">
+                        <a:solidFill>
+                          <a:schemeClr val="tx1"/>
+                        </a:solidFill>
+                      </a:endParaRPr>
+                    </a:p>
+                  </a:txBody>
+                  <a:tcPr/>
+                </a:tc>
+                <a:extLst>
+                  <a:ext uri="{0D108BD9-81ED-4DB2-BD59-A6C34878D82A}">
+                    <a16:rowId xmlns:a16="http://schemas.microsoft.com/office/drawing/2014/main" val="1212950679"/>
+                  </a:ext>
+                </a:extLst>
+              </a:tr>
+              <a:tr h="370840">
+                <a:tc>
+                  <a:txBody>
+                    <a:bodyPr/>
+                    <a:lstStyle/>
+                    <a:p>
+                      <a:r>
+                        <a:rPr lang="de-DE" sz="900">
+                          <a:solidFill>
+                            <a:schemeClr val="tx1"/>
+                          </a:solidFill>
+                        </a:rPr>
                         <a:t>Valid request, but </a:t>
                       </a:r>
                       <a:r>
-                        <a:rPr lang="de-DE" sz="1000">
+                        <a:rPr lang="de-DE" sz="900">
                           <a:solidFill>
                             <a:srgbClr val="C00000"/>
                           </a:solidFill>
@@ -6514,7 +6647,7 @@
                     <a:lstStyle/>
                     <a:p>
                       <a:r>
-                        <a:rPr lang="de-DE" sz="1000">
+                        <a:rPr lang="de-DE" sz="900">
                           <a:solidFill>
                             <a:schemeClr val="tx1"/>
                           </a:solidFill>
@@ -6531,7 +6664,7 @@
                     <a:lstStyle/>
                     <a:p>
                       <a:r>
-                        <a:rPr lang="de-DE" sz="1000">
+                        <a:rPr lang="de-DE" sz="900">
                           <a:solidFill>
                             <a:srgbClr val="C00000"/>
                           </a:solidFill>
@@ -6548,7 +6681,7 @@
                     <a:lstStyle/>
                     <a:p>
                       <a:r>
-                        <a:rPr lang="de-DE" sz="1000">
+                        <a:rPr lang="de-DE" sz="900">
                           <a:solidFill>
                             <a:schemeClr val="tx1"/>
                           </a:solidFill>
@@ -6565,7 +6698,7 @@
                     <a:lstStyle/>
                     <a:p>
                       <a:r>
-                        <a:rPr lang="de-DE" sz="1000">
+                        <a:rPr lang="de-DE" sz="900">
                           <a:solidFill>
                             <a:schemeClr val="tx1"/>
                           </a:solidFill>
@@ -6582,7 +6715,7 @@
                     <a:lstStyle/>
                     <a:p>
                       <a:r>
-                        <a:rPr lang="de-DE" sz="1000">
+                        <a:rPr lang="de-DE" sz="900">
                           <a:solidFill>
                             <a:schemeClr val="tx1"/>
                           </a:solidFill>
@@ -6606,7 +6739,7 @@
                     <a:lstStyle/>
                     <a:p>
                       <a:r>
-                        <a:rPr lang="de-DE" sz="1000">
+                        <a:rPr lang="de-DE" sz="900">
                           <a:solidFill>
                             <a:schemeClr val="tx1"/>
                           </a:solidFill>
@@ -6614,7 +6747,7 @@
                         <a:t>Valid request, but </a:t>
                       </a:r>
                       <a:r>
-                        <a:rPr lang="de-DE" sz="1000">
+                        <a:rPr lang="de-DE" sz="900">
                           <a:solidFill>
                             <a:srgbClr val="C00000"/>
                           </a:solidFill>
@@ -6631,7 +6764,7 @@
                     <a:lstStyle/>
                     <a:p>
                       <a:r>
-                        <a:rPr lang="de-DE" sz="1000">
+                        <a:rPr lang="de-DE" sz="900">
                           <a:solidFill>
                             <a:schemeClr val="tx1"/>
                           </a:solidFill>
@@ -6648,7 +6781,7 @@
                     <a:lstStyle/>
                     <a:p>
                       <a:r>
-                        <a:rPr lang="de-DE" sz="1000">
+                        <a:rPr lang="de-DE" sz="900">
                           <a:solidFill>
                             <a:srgbClr val="C00000"/>
                           </a:solidFill>
@@ -6665,7 +6798,7 @@
                     <a:lstStyle/>
                     <a:p>
                       <a:r>
-                        <a:rPr lang="de-DE" sz="1000">
+                        <a:rPr lang="de-DE" sz="900">
                           <a:solidFill>
                             <a:schemeClr val="tx1"/>
                           </a:solidFill>
@@ -6682,7 +6815,7 @@
                     <a:lstStyle/>
                     <a:p>
                       <a:r>
-                        <a:rPr lang="de-DE" sz="1000">
+                        <a:rPr lang="de-DE" sz="900">
                           <a:solidFill>
                             <a:schemeClr val="tx1"/>
                           </a:solidFill>
@@ -6699,7 +6832,7 @@
                     <a:lstStyle/>
                     <a:p>
                       <a:r>
-                        <a:rPr lang="de-DE" sz="1000">
+                        <a:rPr lang="de-DE" sz="900">
                           <a:solidFill>
                             <a:schemeClr val="tx1"/>
                           </a:solidFill>

</xml_diff>